<commit_message>
Add after lesson 5
</commit_message>
<xml_diff>
--- a/2023-2024/synthèses de cours/complexités.pptx
+++ b/2023-2024/synthèses de cours/complexités.pptx
@@ -13,7 +13,7 @@
     <p:sldId id="260" r:id="rId8"/>
   </p:sldIdLst>
   <p:sldSz cx="9144000" cy="5143500"/>
-  <p:notesSz cx="7559675" cy="10691813"/>
+  <p:notesSz cx="7772400" cy="10058400"/>
 </p:presentation>
 </file>
 
@@ -87,7 +87,7 @@
             <a:pPr algn="ctr">
               <a:buNone/>
             </a:pPr>
-            <a:endParaRPr b="0" lang="fr-FR" sz="4400" spc="-1" strike="noStrike">
+            <a:endParaRPr b="0" lang="en-US" sz="4400" spc="-1" strike="noStrike">
               <a:latin typeface="Arial"/>
             </a:endParaRPr>
           </a:p>
@@ -121,7 +121,7 @@
             <a:normAutofit/>
           </a:bodyPr>
           <a:p>
-            <a:endParaRPr b="0" lang="fr-FR" sz="3200" spc="-1" strike="noStrike">
+            <a:endParaRPr b="0" lang="en-US" sz="3200" spc="-1" strike="noStrike">
               <a:latin typeface="Arial"/>
             </a:endParaRPr>
           </a:p>
@@ -155,7 +155,7 @@
             <a:normAutofit/>
           </a:bodyPr>
           <a:p>
-            <a:endParaRPr b="0" lang="fr-FR" sz="3200" spc="-1" strike="noStrike">
+            <a:endParaRPr b="0" lang="en-US" sz="3200" spc="-1" strike="noStrike">
               <a:latin typeface="Arial"/>
             </a:endParaRPr>
           </a:p>
@@ -214,7 +214,7 @@
             <a:pPr algn="ctr">
               <a:buNone/>
             </a:pPr>
-            <a:endParaRPr b="0" lang="fr-FR" sz="4400" spc="-1" strike="noStrike">
+            <a:endParaRPr b="0" lang="en-US" sz="4400" spc="-1" strike="noStrike">
               <a:latin typeface="Arial"/>
             </a:endParaRPr>
           </a:p>
@@ -248,7 +248,7 @@
             <a:normAutofit/>
           </a:bodyPr>
           <a:p>
-            <a:endParaRPr b="0" lang="fr-FR" sz="3200" spc="-1" strike="noStrike">
+            <a:endParaRPr b="0" lang="en-US" sz="3200" spc="-1" strike="noStrike">
               <a:latin typeface="Arial"/>
             </a:endParaRPr>
           </a:p>
@@ -282,7 +282,7 @@
             <a:normAutofit/>
           </a:bodyPr>
           <a:p>
-            <a:endParaRPr b="0" lang="fr-FR" sz="3200" spc="-1" strike="noStrike">
+            <a:endParaRPr b="0" lang="en-US" sz="3200" spc="-1" strike="noStrike">
               <a:latin typeface="Arial"/>
             </a:endParaRPr>
           </a:p>
@@ -316,7 +316,7 @@
             <a:normAutofit/>
           </a:bodyPr>
           <a:p>
-            <a:endParaRPr b="0" lang="fr-FR" sz="3200" spc="-1" strike="noStrike">
+            <a:endParaRPr b="0" lang="en-US" sz="3200" spc="-1" strike="noStrike">
               <a:latin typeface="Arial"/>
             </a:endParaRPr>
           </a:p>
@@ -350,7 +350,7 @@
             <a:normAutofit/>
           </a:bodyPr>
           <a:p>
-            <a:endParaRPr b="0" lang="fr-FR" sz="3200" spc="-1" strike="noStrike">
+            <a:endParaRPr b="0" lang="en-US" sz="3200" spc="-1" strike="noStrike">
               <a:latin typeface="Arial"/>
             </a:endParaRPr>
           </a:p>
@@ -409,7 +409,7 @@
             <a:pPr algn="ctr">
               <a:buNone/>
             </a:pPr>
-            <a:endParaRPr b="0" lang="fr-FR" sz="4400" spc="-1" strike="noStrike">
+            <a:endParaRPr b="0" lang="en-US" sz="4400" spc="-1" strike="noStrike">
               <a:latin typeface="Arial"/>
             </a:endParaRPr>
           </a:p>
@@ -443,7 +443,7 @@
             <a:normAutofit/>
           </a:bodyPr>
           <a:p>
-            <a:endParaRPr b="0" lang="fr-FR" sz="3200" spc="-1" strike="noStrike">
+            <a:endParaRPr b="0" lang="en-US" sz="3200" spc="-1" strike="noStrike">
               <a:latin typeface="Arial"/>
             </a:endParaRPr>
           </a:p>
@@ -477,7 +477,7 @@
             <a:normAutofit/>
           </a:bodyPr>
           <a:p>
-            <a:endParaRPr b="0" lang="fr-FR" sz="3200" spc="-1" strike="noStrike">
+            <a:endParaRPr b="0" lang="en-US" sz="3200" spc="-1" strike="noStrike">
               <a:latin typeface="Arial"/>
             </a:endParaRPr>
           </a:p>
@@ -511,7 +511,7 @@
             <a:normAutofit/>
           </a:bodyPr>
           <a:p>
-            <a:endParaRPr b="0" lang="fr-FR" sz="3200" spc="-1" strike="noStrike">
+            <a:endParaRPr b="0" lang="en-US" sz="3200" spc="-1" strike="noStrike">
               <a:latin typeface="Arial"/>
             </a:endParaRPr>
           </a:p>
@@ -545,7 +545,7 @@
             <a:normAutofit/>
           </a:bodyPr>
           <a:p>
-            <a:endParaRPr b="0" lang="fr-FR" sz="3200" spc="-1" strike="noStrike">
+            <a:endParaRPr b="0" lang="en-US" sz="3200" spc="-1" strike="noStrike">
               <a:latin typeface="Arial"/>
             </a:endParaRPr>
           </a:p>
@@ -579,7 +579,7 @@
             <a:normAutofit/>
           </a:bodyPr>
           <a:p>
-            <a:endParaRPr b="0" lang="fr-FR" sz="3200" spc="-1" strike="noStrike">
+            <a:endParaRPr b="0" lang="en-US" sz="3200" spc="-1" strike="noStrike">
               <a:latin typeface="Arial"/>
             </a:endParaRPr>
           </a:p>
@@ -613,7 +613,7 @@
             <a:normAutofit/>
           </a:bodyPr>
           <a:p>
-            <a:endParaRPr b="0" lang="fr-FR" sz="3200" spc="-1" strike="noStrike">
+            <a:endParaRPr b="0" lang="en-US" sz="3200" spc="-1" strike="noStrike">
               <a:latin typeface="Arial"/>
             </a:endParaRPr>
           </a:p>
@@ -694,7 +694,7 @@
             <a:pPr algn="ctr">
               <a:buNone/>
             </a:pPr>
-            <a:endParaRPr b="0" lang="fr-FR" sz="4400" spc="-1" strike="noStrike">
+            <a:endParaRPr b="0" lang="en-US" sz="4400" spc="-1" strike="noStrike">
               <a:latin typeface="Arial"/>
             </a:endParaRPr>
           </a:p>
@@ -731,7 +731,7 @@
             <a:pPr algn="ctr">
               <a:buNone/>
             </a:pPr>
-            <a:endParaRPr b="0" lang="fr-FR" sz="3200" spc="-1" strike="noStrike">
+            <a:endParaRPr b="0" lang="en-US" sz="3200" spc="-1" strike="noStrike">
               <a:latin typeface="Arial"/>
             </a:endParaRPr>
           </a:p>
@@ -790,7 +790,7 @@
             <a:pPr algn="ctr">
               <a:buNone/>
             </a:pPr>
-            <a:endParaRPr b="0" lang="fr-FR" sz="4400" spc="-1" strike="noStrike">
+            <a:endParaRPr b="0" lang="en-US" sz="4400" spc="-1" strike="noStrike">
               <a:latin typeface="Arial"/>
             </a:endParaRPr>
           </a:p>
@@ -824,7 +824,7 @@
             <a:normAutofit/>
           </a:bodyPr>
           <a:p>
-            <a:endParaRPr b="0" lang="fr-FR" sz="3200" spc="-1" strike="noStrike">
+            <a:endParaRPr b="0" lang="en-US" sz="3200" spc="-1" strike="noStrike">
               <a:latin typeface="Arial"/>
             </a:endParaRPr>
           </a:p>
@@ -883,7 +883,7 @@
             <a:pPr algn="ctr">
               <a:buNone/>
             </a:pPr>
-            <a:endParaRPr b="0" lang="fr-FR" sz="4400" spc="-1" strike="noStrike">
+            <a:endParaRPr b="0" lang="en-US" sz="4400" spc="-1" strike="noStrike">
               <a:latin typeface="Arial"/>
             </a:endParaRPr>
           </a:p>
@@ -917,7 +917,7 @@
             <a:normAutofit/>
           </a:bodyPr>
           <a:p>
-            <a:endParaRPr b="0" lang="fr-FR" sz="3200" spc="-1" strike="noStrike">
+            <a:endParaRPr b="0" lang="en-US" sz="3200" spc="-1" strike="noStrike">
               <a:latin typeface="Arial"/>
             </a:endParaRPr>
           </a:p>
@@ -951,7 +951,7 @@
             <a:normAutofit/>
           </a:bodyPr>
           <a:p>
-            <a:endParaRPr b="0" lang="fr-FR" sz="3200" spc="-1" strike="noStrike">
+            <a:endParaRPr b="0" lang="en-US" sz="3200" spc="-1" strike="noStrike">
               <a:latin typeface="Arial"/>
             </a:endParaRPr>
           </a:p>
@@ -1010,7 +1010,7 @@
             <a:pPr algn="ctr">
               <a:buNone/>
             </a:pPr>
-            <a:endParaRPr b="0" lang="fr-FR" sz="4400" spc="-1" strike="noStrike">
+            <a:endParaRPr b="0" lang="en-US" sz="4400" spc="-1" strike="noStrike">
               <a:latin typeface="Arial"/>
             </a:endParaRPr>
           </a:p>
@@ -1069,7 +1069,7 @@
             <a:pPr algn="ctr">
               <a:buNone/>
             </a:pPr>
-            <a:endParaRPr b="0" lang="fr-FR" sz="3200" spc="-1" strike="noStrike">
+            <a:endParaRPr b="0" lang="en-US" sz="3200" spc="-1" strike="noStrike">
               <a:latin typeface="Arial"/>
             </a:endParaRPr>
           </a:p>
@@ -1128,7 +1128,7 @@
             <a:pPr algn="ctr">
               <a:buNone/>
             </a:pPr>
-            <a:endParaRPr b="0" lang="fr-FR" sz="4400" spc="-1" strike="noStrike">
+            <a:endParaRPr b="0" lang="en-US" sz="4400" spc="-1" strike="noStrike">
               <a:latin typeface="Arial"/>
             </a:endParaRPr>
           </a:p>
@@ -1162,7 +1162,7 @@
             <a:normAutofit/>
           </a:bodyPr>
           <a:p>
-            <a:endParaRPr b="0" lang="fr-FR" sz="3200" spc="-1" strike="noStrike">
+            <a:endParaRPr b="0" lang="en-US" sz="3200" spc="-1" strike="noStrike">
               <a:latin typeface="Arial"/>
             </a:endParaRPr>
           </a:p>
@@ -1196,7 +1196,7 @@
             <a:normAutofit/>
           </a:bodyPr>
           <a:p>
-            <a:endParaRPr b="0" lang="fr-FR" sz="3200" spc="-1" strike="noStrike">
+            <a:endParaRPr b="0" lang="en-US" sz="3200" spc="-1" strike="noStrike">
               <a:latin typeface="Arial"/>
             </a:endParaRPr>
           </a:p>
@@ -1230,7 +1230,7 @@
             <a:normAutofit/>
           </a:bodyPr>
           <a:p>
-            <a:endParaRPr b="0" lang="fr-FR" sz="3200" spc="-1" strike="noStrike">
+            <a:endParaRPr b="0" lang="en-US" sz="3200" spc="-1" strike="noStrike">
               <a:latin typeface="Arial"/>
             </a:endParaRPr>
           </a:p>
@@ -1289,7 +1289,7 @@
             <a:pPr algn="ctr">
               <a:buNone/>
             </a:pPr>
-            <a:endParaRPr b="0" lang="fr-FR" sz="4400" spc="-1" strike="noStrike">
+            <a:endParaRPr b="0" lang="en-US" sz="4400" spc="-1" strike="noStrike">
               <a:latin typeface="Arial"/>
             </a:endParaRPr>
           </a:p>
@@ -1326,7 +1326,7 @@
             <a:pPr algn="ctr">
               <a:buNone/>
             </a:pPr>
-            <a:endParaRPr b="0" lang="fr-FR" sz="3200" spc="-1" strike="noStrike">
+            <a:endParaRPr b="0" lang="en-US" sz="3200" spc="-1" strike="noStrike">
               <a:latin typeface="Arial"/>
             </a:endParaRPr>
           </a:p>
@@ -1385,7 +1385,7 @@
             <a:pPr algn="ctr">
               <a:buNone/>
             </a:pPr>
-            <a:endParaRPr b="0" lang="fr-FR" sz="4400" spc="-1" strike="noStrike">
+            <a:endParaRPr b="0" lang="en-US" sz="4400" spc="-1" strike="noStrike">
               <a:latin typeface="Arial"/>
             </a:endParaRPr>
           </a:p>
@@ -1419,7 +1419,7 @@
             <a:normAutofit/>
           </a:bodyPr>
           <a:p>
-            <a:endParaRPr b="0" lang="fr-FR" sz="3200" spc="-1" strike="noStrike">
+            <a:endParaRPr b="0" lang="en-US" sz="3200" spc="-1" strike="noStrike">
               <a:latin typeface="Arial"/>
             </a:endParaRPr>
           </a:p>
@@ -1453,7 +1453,7 @@
             <a:normAutofit/>
           </a:bodyPr>
           <a:p>
-            <a:endParaRPr b="0" lang="fr-FR" sz="3200" spc="-1" strike="noStrike">
+            <a:endParaRPr b="0" lang="en-US" sz="3200" spc="-1" strike="noStrike">
               <a:latin typeface="Arial"/>
             </a:endParaRPr>
           </a:p>
@@ -1487,7 +1487,7 @@
             <a:normAutofit/>
           </a:bodyPr>
           <a:p>
-            <a:endParaRPr b="0" lang="fr-FR" sz="3200" spc="-1" strike="noStrike">
+            <a:endParaRPr b="0" lang="en-US" sz="3200" spc="-1" strike="noStrike">
               <a:latin typeface="Arial"/>
             </a:endParaRPr>
           </a:p>
@@ -1546,7 +1546,7 @@
             <a:pPr algn="ctr">
               <a:buNone/>
             </a:pPr>
-            <a:endParaRPr b="0" lang="fr-FR" sz="4400" spc="-1" strike="noStrike">
+            <a:endParaRPr b="0" lang="en-US" sz="4400" spc="-1" strike="noStrike">
               <a:latin typeface="Arial"/>
             </a:endParaRPr>
           </a:p>
@@ -1580,7 +1580,7 @@
             <a:normAutofit/>
           </a:bodyPr>
           <a:p>
-            <a:endParaRPr b="0" lang="fr-FR" sz="3200" spc="-1" strike="noStrike">
+            <a:endParaRPr b="0" lang="en-US" sz="3200" spc="-1" strike="noStrike">
               <a:latin typeface="Arial"/>
             </a:endParaRPr>
           </a:p>
@@ -1614,7 +1614,7 @@
             <a:normAutofit/>
           </a:bodyPr>
           <a:p>
-            <a:endParaRPr b="0" lang="fr-FR" sz="3200" spc="-1" strike="noStrike">
+            <a:endParaRPr b="0" lang="en-US" sz="3200" spc="-1" strike="noStrike">
               <a:latin typeface="Arial"/>
             </a:endParaRPr>
           </a:p>
@@ -1648,7 +1648,7 @@
             <a:normAutofit/>
           </a:bodyPr>
           <a:p>
-            <a:endParaRPr b="0" lang="fr-FR" sz="3200" spc="-1" strike="noStrike">
+            <a:endParaRPr b="0" lang="en-US" sz="3200" spc="-1" strike="noStrike">
               <a:latin typeface="Arial"/>
             </a:endParaRPr>
           </a:p>
@@ -1707,7 +1707,7 @@
             <a:pPr algn="ctr">
               <a:buNone/>
             </a:pPr>
-            <a:endParaRPr b="0" lang="fr-FR" sz="4400" spc="-1" strike="noStrike">
+            <a:endParaRPr b="0" lang="en-US" sz="4400" spc="-1" strike="noStrike">
               <a:latin typeface="Arial"/>
             </a:endParaRPr>
           </a:p>
@@ -1741,7 +1741,7 @@
             <a:normAutofit/>
           </a:bodyPr>
           <a:p>
-            <a:endParaRPr b="0" lang="fr-FR" sz="3200" spc="-1" strike="noStrike">
+            <a:endParaRPr b="0" lang="en-US" sz="3200" spc="-1" strike="noStrike">
               <a:latin typeface="Arial"/>
             </a:endParaRPr>
           </a:p>
@@ -1775,7 +1775,7 @@
             <a:normAutofit/>
           </a:bodyPr>
           <a:p>
-            <a:endParaRPr b="0" lang="fr-FR" sz="3200" spc="-1" strike="noStrike">
+            <a:endParaRPr b="0" lang="en-US" sz="3200" spc="-1" strike="noStrike">
               <a:latin typeface="Arial"/>
             </a:endParaRPr>
           </a:p>
@@ -1834,7 +1834,7 @@
             <a:pPr algn="ctr">
               <a:buNone/>
             </a:pPr>
-            <a:endParaRPr b="0" lang="fr-FR" sz="4400" spc="-1" strike="noStrike">
+            <a:endParaRPr b="0" lang="en-US" sz="4400" spc="-1" strike="noStrike">
               <a:latin typeface="Arial"/>
             </a:endParaRPr>
           </a:p>
@@ -1868,7 +1868,7 @@
             <a:normAutofit/>
           </a:bodyPr>
           <a:p>
-            <a:endParaRPr b="0" lang="fr-FR" sz="3200" spc="-1" strike="noStrike">
+            <a:endParaRPr b="0" lang="en-US" sz="3200" spc="-1" strike="noStrike">
               <a:latin typeface="Arial"/>
             </a:endParaRPr>
           </a:p>
@@ -1902,7 +1902,7 @@
             <a:normAutofit/>
           </a:bodyPr>
           <a:p>
-            <a:endParaRPr b="0" lang="fr-FR" sz="3200" spc="-1" strike="noStrike">
+            <a:endParaRPr b="0" lang="en-US" sz="3200" spc="-1" strike="noStrike">
               <a:latin typeface="Arial"/>
             </a:endParaRPr>
           </a:p>
@@ -1936,7 +1936,7 @@
             <a:normAutofit/>
           </a:bodyPr>
           <a:p>
-            <a:endParaRPr b="0" lang="fr-FR" sz="3200" spc="-1" strike="noStrike">
+            <a:endParaRPr b="0" lang="en-US" sz="3200" spc="-1" strike="noStrike">
               <a:latin typeface="Arial"/>
             </a:endParaRPr>
           </a:p>
@@ -1970,7 +1970,7 @@
             <a:normAutofit/>
           </a:bodyPr>
           <a:p>
-            <a:endParaRPr b="0" lang="fr-FR" sz="3200" spc="-1" strike="noStrike">
+            <a:endParaRPr b="0" lang="en-US" sz="3200" spc="-1" strike="noStrike">
               <a:latin typeface="Arial"/>
             </a:endParaRPr>
           </a:p>
@@ -2029,7 +2029,7 @@
             <a:pPr algn="ctr">
               <a:buNone/>
             </a:pPr>
-            <a:endParaRPr b="0" lang="fr-FR" sz="4400" spc="-1" strike="noStrike">
+            <a:endParaRPr b="0" lang="en-US" sz="4400" spc="-1" strike="noStrike">
               <a:latin typeface="Arial"/>
             </a:endParaRPr>
           </a:p>
@@ -2063,7 +2063,7 @@
             <a:normAutofit/>
           </a:bodyPr>
           <a:p>
-            <a:endParaRPr b="0" lang="fr-FR" sz="3200" spc="-1" strike="noStrike">
+            <a:endParaRPr b="0" lang="en-US" sz="3200" spc="-1" strike="noStrike">
               <a:latin typeface="Arial"/>
             </a:endParaRPr>
           </a:p>
@@ -2097,7 +2097,7 @@
             <a:normAutofit/>
           </a:bodyPr>
           <a:p>
-            <a:endParaRPr b="0" lang="fr-FR" sz="3200" spc="-1" strike="noStrike">
+            <a:endParaRPr b="0" lang="en-US" sz="3200" spc="-1" strike="noStrike">
               <a:latin typeface="Arial"/>
             </a:endParaRPr>
           </a:p>
@@ -2131,7 +2131,7 @@
             <a:normAutofit/>
           </a:bodyPr>
           <a:p>
-            <a:endParaRPr b="0" lang="fr-FR" sz="3200" spc="-1" strike="noStrike">
+            <a:endParaRPr b="0" lang="en-US" sz="3200" spc="-1" strike="noStrike">
               <a:latin typeface="Arial"/>
             </a:endParaRPr>
           </a:p>
@@ -2165,7 +2165,7 @@
             <a:normAutofit/>
           </a:bodyPr>
           <a:p>
-            <a:endParaRPr b="0" lang="fr-FR" sz="3200" spc="-1" strike="noStrike">
+            <a:endParaRPr b="0" lang="en-US" sz="3200" spc="-1" strike="noStrike">
               <a:latin typeface="Arial"/>
             </a:endParaRPr>
           </a:p>
@@ -2199,7 +2199,7 @@
             <a:normAutofit/>
           </a:bodyPr>
           <a:p>
-            <a:endParaRPr b="0" lang="fr-FR" sz="3200" spc="-1" strike="noStrike">
+            <a:endParaRPr b="0" lang="en-US" sz="3200" spc="-1" strike="noStrike">
               <a:latin typeface="Arial"/>
             </a:endParaRPr>
           </a:p>
@@ -2233,7 +2233,7 @@
             <a:normAutofit/>
           </a:bodyPr>
           <a:p>
-            <a:endParaRPr b="0" lang="fr-FR" sz="3200" spc="-1" strike="noStrike">
+            <a:endParaRPr b="0" lang="en-US" sz="3200" spc="-1" strike="noStrike">
               <a:latin typeface="Arial"/>
             </a:endParaRPr>
           </a:p>
@@ -2292,7 +2292,7 @@
             <a:pPr algn="ctr">
               <a:buNone/>
             </a:pPr>
-            <a:endParaRPr b="0" lang="fr-FR" sz="4400" spc="-1" strike="noStrike">
+            <a:endParaRPr b="0" lang="en-US" sz="4400" spc="-1" strike="noStrike">
               <a:latin typeface="Arial"/>
             </a:endParaRPr>
           </a:p>
@@ -2326,7 +2326,7 @@
             <a:normAutofit/>
           </a:bodyPr>
           <a:p>
-            <a:endParaRPr b="0" lang="fr-FR" sz="3200" spc="-1" strike="noStrike">
+            <a:endParaRPr b="0" lang="en-US" sz="3200" spc="-1" strike="noStrike">
               <a:latin typeface="Arial"/>
             </a:endParaRPr>
           </a:p>
@@ -2385,7 +2385,7 @@
             <a:pPr algn="ctr">
               <a:buNone/>
             </a:pPr>
-            <a:endParaRPr b="0" lang="fr-FR" sz="4400" spc="-1" strike="noStrike">
+            <a:endParaRPr b="0" lang="en-US" sz="4400" spc="-1" strike="noStrike">
               <a:latin typeface="Arial"/>
             </a:endParaRPr>
           </a:p>
@@ -2419,7 +2419,7 @@
             <a:normAutofit/>
           </a:bodyPr>
           <a:p>
-            <a:endParaRPr b="0" lang="fr-FR" sz="3200" spc="-1" strike="noStrike">
+            <a:endParaRPr b="0" lang="en-US" sz="3200" spc="-1" strike="noStrike">
               <a:latin typeface="Arial"/>
             </a:endParaRPr>
           </a:p>
@@ -2453,7 +2453,7 @@
             <a:normAutofit/>
           </a:bodyPr>
           <a:p>
-            <a:endParaRPr b="0" lang="fr-FR" sz="3200" spc="-1" strike="noStrike">
+            <a:endParaRPr b="0" lang="en-US" sz="3200" spc="-1" strike="noStrike">
               <a:latin typeface="Arial"/>
             </a:endParaRPr>
           </a:p>
@@ -2512,7 +2512,7 @@
             <a:pPr algn="ctr">
               <a:buNone/>
             </a:pPr>
-            <a:endParaRPr b="0" lang="fr-FR" sz="4400" spc="-1" strike="noStrike">
+            <a:endParaRPr b="0" lang="en-US" sz="4400" spc="-1" strike="noStrike">
               <a:latin typeface="Arial"/>
             </a:endParaRPr>
           </a:p>
@@ -2571,7 +2571,7 @@
             <a:pPr algn="ctr">
               <a:buNone/>
             </a:pPr>
-            <a:endParaRPr b="0" lang="fr-FR" sz="3200" spc="-1" strike="noStrike">
+            <a:endParaRPr b="0" lang="en-US" sz="3200" spc="-1" strike="noStrike">
               <a:latin typeface="Arial"/>
             </a:endParaRPr>
           </a:p>
@@ -2630,7 +2630,7 @@
             <a:pPr algn="ctr">
               <a:buNone/>
             </a:pPr>
-            <a:endParaRPr b="0" lang="fr-FR" sz="4400" spc="-1" strike="noStrike">
+            <a:endParaRPr b="0" lang="en-US" sz="4400" spc="-1" strike="noStrike">
               <a:latin typeface="Arial"/>
             </a:endParaRPr>
           </a:p>
@@ -2664,7 +2664,7 @@
             <a:normAutofit/>
           </a:bodyPr>
           <a:p>
-            <a:endParaRPr b="0" lang="fr-FR" sz="3200" spc="-1" strike="noStrike">
+            <a:endParaRPr b="0" lang="en-US" sz="3200" spc="-1" strike="noStrike">
               <a:latin typeface="Arial"/>
             </a:endParaRPr>
           </a:p>
@@ -2698,7 +2698,7 @@
             <a:normAutofit/>
           </a:bodyPr>
           <a:p>
-            <a:endParaRPr b="0" lang="fr-FR" sz="3200" spc="-1" strike="noStrike">
+            <a:endParaRPr b="0" lang="en-US" sz="3200" spc="-1" strike="noStrike">
               <a:latin typeface="Arial"/>
             </a:endParaRPr>
           </a:p>
@@ -2732,7 +2732,7 @@
             <a:normAutofit/>
           </a:bodyPr>
           <a:p>
-            <a:endParaRPr b="0" lang="fr-FR" sz="3200" spc="-1" strike="noStrike">
+            <a:endParaRPr b="0" lang="en-US" sz="3200" spc="-1" strike="noStrike">
               <a:latin typeface="Arial"/>
             </a:endParaRPr>
           </a:p>
@@ -2791,7 +2791,7 @@
             <a:pPr algn="ctr">
               <a:buNone/>
             </a:pPr>
-            <a:endParaRPr b="0" lang="fr-FR" sz="4400" spc="-1" strike="noStrike">
+            <a:endParaRPr b="0" lang="en-US" sz="4400" spc="-1" strike="noStrike">
               <a:latin typeface="Arial"/>
             </a:endParaRPr>
           </a:p>
@@ -2825,7 +2825,7 @@
             <a:normAutofit/>
           </a:bodyPr>
           <a:p>
-            <a:endParaRPr b="0" lang="fr-FR" sz="3200" spc="-1" strike="noStrike">
+            <a:endParaRPr b="0" lang="en-US" sz="3200" spc="-1" strike="noStrike">
               <a:latin typeface="Arial"/>
             </a:endParaRPr>
           </a:p>
@@ -2859,7 +2859,7 @@
             <a:normAutofit/>
           </a:bodyPr>
           <a:p>
-            <a:endParaRPr b="0" lang="fr-FR" sz="3200" spc="-1" strike="noStrike">
+            <a:endParaRPr b="0" lang="en-US" sz="3200" spc="-1" strike="noStrike">
               <a:latin typeface="Arial"/>
             </a:endParaRPr>
           </a:p>
@@ -2893,7 +2893,7 @@
             <a:normAutofit/>
           </a:bodyPr>
           <a:p>
-            <a:endParaRPr b="0" lang="fr-FR" sz="3200" spc="-1" strike="noStrike">
+            <a:endParaRPr b="0" lang="en-US" sz="3200" spc="-1" strike="noStrike">
               <a:latin typeface="Arial"/>
             </a:endParaRPr>
           </a:p>
@@ -2952,7 +2952,7 @@
             <a:pPr algn="ctr">
               <a:buNone/>
             </a:pPr>
-            <a:endParaRPr b="0" lang="fr-FR" sz="4400" spc="-1" strike="noStrike">
+            <a:endParaRPr b="0" lang="en-US" sz="4400" spc="-1" strike="noStrike">
               <a:latin typeface="Arial"/>
             </a:endParaRPr>
           </a:p>
@@ -2986,7 +2986,7 @@
             <a:normAutofit/>
           </a:bodyPr>
           <a:p>
-            <a:endParaRPr b="0" lang="fr-FR" sz="3200" spc="-1" strike="noStrike">
+            <a:endParaRPr b="0" lang="en-US" sz="3200" spc="-1" strike="noStrike">
               <a:latin typeface="Arial"/>
             </a:endParaRPr>
           </a:p>
@@ -3020,7 +3020,7 @@
             <a:normAutofit/>
           </a:bodyPr>
           <a:p>
-            <a:endParaRPr b="0" lang="fr-FR" sz="3200" spc="-1" strike="noStrike">
+            <a:endParaRPr b="0" lang="en-US" sz="3200" spc="-1" strike="noStrike">
               <a:latin typeface="Arial"/>
             </a:endParaRPr>
           </a:p>
@@ -3054,7 +3054,7 @@
             <a:normAutofit/>
           </a:bodyPr>
           <a:p>
-            <a:endParaRPr b="0" lang="fr-FR" sz="3200" spc="-1" strike="noStrike">
+            <a:endParaRPr b="0" lang="en-US" sz="3200" spc="-1" strike="noStrike">
               <a:latin typeface="Arial"/>
             </a:endParaRPr>
           </a:p>
@@ -3098,7 +3098,7 @@
         <p:spPr>
           <a:xfrm>
             <a:off x="314280" y="4535640"/>
-            <a:ext cx="271080" cy="330840"/>
+            <a:ext cx="270720" cy="330480"/>
           </a:xfrm>
           <a:prstGeom prst="rect">
             <a:avLst/>
@@ -3128,7 +3128,7 @@
               </a:spcAft>
               <a:buNone/>
             </a:pPr>
-            <a:fld id="{95990135-5580-4D58-A1C6-4DC9F30D832E}" type="slidenum">
+            <a:fld id="{044EFC59-894D-42DE-B3D7-094390F918B9}" type="slidenum">
               <a:rPr b="0" lang="fr-FR" sz="800" spc="-1" strike="noStrike">
                 <a:solidFill>
                   <a:srgbClr val="000000"/>
@@ -3138,7 +3138,7 @@
               </a:rPr>
               <a:t>&lt;number&gt;</a:t>
             </a:fld>
-            <a:endParaRPr b="0" lang="fr-FR" sz="800" spc="-1" strike="noStrike">
+            <a:endParaRPr b="0" lang="en-US" sz="800" spc="-1" strike="noStrike">
               <a:latin typeface="Arial"/>
             </a:endParaRPr>
           </a:p>
@@ -3153,7 +3153,7 @@
         <p:spPr>
           <a:xfrm>
             <a:off x="619560" y="4749120"/>
-            <a:ext cx="360" cy="119160"/>
+            <a:ext cx="360" cy="118800"/>
           </a:xfrm>
           <a:prstGeom prst="rect">
             <a:avLst/>
@@ -3202,18 +3202,18 @@
               <a:buNone/>
             </a:pPr>
             <a:r>
-              <a:rPr b="0" lang="fr-FR" sz="4400" spc="-1" strike="noStrike">
+              <a:rPr b="0" lang="en-US" sz="4400" spc="-1" strike="noStrike">
                 <a:latin typeface="Arial"/>
               </a:rPr>
               <a:t>Click to edit the </a:t>
             </a:r>
             <a:r>
-              <a:rPr b="0" lang="fr-FR" sz="4400" spc="-1" strike="noStrike">
+              <a:rPr b="0" lang="en-US" sz="4400" spc="-1" strike="noStrike">
                 <a:latin typeface="Arial"/>
               </a:rPr>
               <a:t>title text format</a:t>
             </a:r>
-            <a:endParaRPr b="0" lang="fr-FR" sz="4400" spc="-1" strike="noStrike">
+            <a:endParaRPr b="0" lang="en-US" sz="4400" spc="-1" strike="noStrike">
               <a:latin typeface="Arial"/>
             </a:endParaRPr>
           </a:p>
@@ -3259,12 +3259,12 @@
               <a:buChar char=""/>
             </a:pPr>
             <a:r>
-              <a:rPr b="0" lang="fr-FR" sz="3200" spc="-1" strike="noStrike">
+              <a:rPr b="0" lang="en-US" sz="3200" spc="-1" strike="noStrike">
                 <a:latin typeface="Arial"/>
               </a:rPr>
               <a:t>Click to edit the outline text format</a:t>
             </a:r>
-            <a:endParaRPr b="0" lang="fr-FR" sz="3200" spc="-1" strike="noStrike">
+            <a:endParaRPr b="0" lang="en-US" sz="3200" spc="-1" strike="noStrike">
               <a:latin typeface="Arial"/>
             </a:endParaRPr>
           </a:p>
@@ -3281,12 +3281,12 @@
               <a:buChar char=""/>
             </a:pPr>
             <a:r>
-              <a:rPr b="0" lang="fr-FR" sz="2800" spc="-1" strike="noStrike">
+              <a:rPr b="0" lang="en-US" sz="2800" spc="-1" strike="noStrike">
                 <a:latin typeface="Arial"/>
               </a:rPr>
               <a:t>Second Outline Level</a:t>
             </a:r>
-            <a:endParaRPr b="0" lang="fr-FR" sz="2800" spc="-1" strike="noStrike">
+            <a:endParaRPr b="0" lang="en-US" sz="2800" spc="-1" strike="noStrike">
               <a:latin typeface="Arial"/>
             </a:endParaRPr>
           </a:p>
@@ -3303,12 +3303,12 @@
               <a:buChar char=""/>
             </a:pPr>
             <a:r>
-              <a:rPr b="0" lang="fr-FR" sz="2400" spc="-1" strike="noStrike">
+              <a:rPr b="0" lang="en-US" sz="2400" spc="-1" strike="noStrike">
                 <a:latin typeface="Arial"/>
               </a:rPr>
               <a:t>Third Outline Level</a:t>
             </a:r>
-            <a:endParaRPr b="0" lang="fr-FR" sz="2400" spc="-1" strike="noStrike">
+            <a:endParaRPr b="0" lang="en-US" sz="2400" spc="-1" strike="noStrike">
               <a:latin typeface="Arial"/>
             </a:endParaRPr>
           </a:p>
@@ -3325,12 +3325,12 @@
               <a:buChar char=""/>
             </a:pPr>
             <a:r>
-              <a:rPr b="0" lang="fr-FR" sz="2000" spc="-1" strike="noStrike">
+              <a:rPr b="0" lang="en-US" sz="2000" spc="-1" strike="noStrike">
                 <a:latin typeface="Arial"/>
               </a:rPr>
               <a:t>Fourth Outline Level</a:t>
             </a:r>
-            <a:endParaRPr b="0" lang="fr-FR" sz="2000" spc="-1" strike="noStrike">
+            <a:endParaRPr b="0" lang="en-US" sz="2000" spc="-1" strike="noStrike">
               <a:latin typeface="Arial"/>
             </a:endParaRPr>
           </a:p>
@@ -3347,12 +3347,12 @@
               <a:buChar char=""/>
             </a:pPr>
             <a:r>
-              <a:rPr b="0" lang="fr-FR" sz="2000" spc="-1" strike="noStrike">
+              <a:rPr b="0" lang="en-US" sz="2000" spc="-1" strike="noStrike">
                 <a:latin typeface="Arial"/>
               </a:rPr>
               <a:t>Fifth Outline Level</a:t>
             </a:r>
-            <a:endParaRPr b="0" lang="fr-FR" sz="2000" spc="-1" strike="noStrike">
+            <a:endParaRPr b="0" lang="en-US" sz="2000" spc="-1" strike="noStrike">
               <a:latin typeface="Arial"/>
             </a:endParaRPr>
           </a:p>
@@ -3369,12 +3369,12 @@
               <a:buChar char=""/>
             </a:pPr>
             <a:r>
-              <a:rPr b="0" lang="fr-FR" sz="2000" spc="-1" strike="noStrike">
+              <a:rPr b="0" lang="en-US" sz="2000" spc="-1" strike="noStrike">
                 <a:latin typeface="Arial"/>
               </a:rPr>
               <a:t>Sixth Outline Level</a:t>
             </a:r>
-            <a:endParaRPr b="0" lang="fr-FR" sz="2000" spc="-1" strike="noStrike">
+            <a:endParaRPr b="0" lang="en-US" sz="2000" spc="-1" strike="noStrike">
               <a:latin typeface="Arial"/>
             </a:endParaRPr>
           </a:p>
@@ -3391,12 +3391,12 @@
               <a:buChar char=""/>
             </a:pPr>
             <a:r>
-              <a:rPr b="0" lang="fr-FR" sz="2000" spc="-1" strike="noStrike">
+              <a:rPr b="0" lang="en-US" sz="2000" spc="-1" strike="noStrike">
                 <a:latin typeface="Arial"/>
               </a:rPr>
               <a:t>Seventh Outline Level</a:t>
             </a:r>
-            <a:endParaRPr b="0" lang="fr-FR" sz="2000" spc="-1" strike="noStrike">
+            <a:endParaRPr b="0" lang="en-US" sz="2000" spc="-1" strike="noStrike">
               <a:latin typeface="Arial"/>
             </a:endParaRPr>
           </a:p>
@@ -3455,7 +3455,7 @@
         <p:spPr>
           <a:xfrm>
             <a:off x="314280" y="4535640"/>
-            <a:ext cx="271080" cy="330840"/>
+            <a:ext cx="270720" cy="330480"/>
           </a:xfrm>
           <a:prstGeom prst="rect">
             <a:avLst/>
@@ -3485,7 +3485,7 @@
               </a:spcAft>
               <a:buNone/>
             </a:pPr>
-            <a:fld id="{1B8850C6-013E-4716-ABC3-CDE256ACF8A2}" type="slidenum">
+            <a:fld id="{88FDEA14-A393-447A-8334-E743B95EFC87}" type="slidenum">
               <a:rPr b="0" lang="fr-FR" sz="800" spc="-1" strike="noStrike">
                 <a:solidFill>
                   <a:srgbClr val="000000"/>
@@ -3495,7 +3495,7 @@
               </a:rPr>
               <a:t>&lt;number&gt;</a:t>
             </a:fld>
-            <a:endParaRPr b="0" lang="fr-FR" sz="800" spc="-1" strike="noStrike">
+            <a:endParaRPr b="0" lang="en-US" sz="800" spc="-1" strike="noStrike">
               <a:latin typeface="Arial"/>
             </a:endParaRPr>
           </a:p>
@@ -3510,7 +3510,7 @@
         <p:spPr>
           <a:xfrm>
             <a:off x="619560" y="4749120"/>
-            <a:ext cx="360" cy="119160"/>
+            <a:ext cx="360" cy="118800"/>
           </a:xfrm>
           <a:prstGeom prst="rect">
             <a:avLst/>
@@ -3559,18 +3559,18 @@
               <a:buNone/>
             </a:pPr>
             <a:r>
-              <a:rPr b="0" lang="fr-FR" sz="4400" spc="-1" strike="noStrike">
+              <a:rPr b="0" lang="en-US" sz="4400" spc="-1" strike="noStrike">
                 <a:latin typeface="Arial"/>
               </a:rPr>
               <a:t>Click to edit the </a:t>
             </a:r>
             <a:r>
-              <a:rPr b="0" lang="fr-FR" sz="4400" spc="-1" strike="noStrike">
+              <a:rPr b="0" lang="en-US" sz="4400" spc="-1" strike="noStrike">
                 <a:latin typeface="Arial"/>
               </a:rPr>
               <a:t>title text format</a:t>
             </a:r>
-            <a:endParaRPr b="0" lang="fr-FR" sz="4400" spc="-1" strike="noStrike">
+            <a:endParaRPr b="0" lang="en-US" sz="4400" spc="-1" strike="noStrike">
               <a:latin typeface="Arial"/>
             </a:endParaRPr>
           </a:p>
@@ -3616,12 +3616,12 @@
               <a:buChar char=""/>
             </a:pPr>
             <a:r>
-              <a:rPr b="0" lang="fr-FR" sz="3200" spc="-1" strike="noStrike">
+              <a:rPr b="0" lang="en-US" sz="3200" spc="-1" strike="noStrike">
                 <a:latin typeface="Arial"/>
               </a:rPr>
               <a:t>Click to edit the outline text format</a:t>
             </a:r>
-            <a:endParaRPr b="0" lang="fr-FR" sz="3200" spc="-1" strike="noStrike">
+            <a:endParaRPr b="0" lang="en-US" sz="3200" spc="-1" strike="noStrike">
               <a:latin typeface="Arial"/>
             </a:endParaRPr>
           </a:p>
@@ -3638,12 +3638,12 @@
               <a:buChar char=""/>
             </a:pPr>
             <a:r>
-              <a:rPr b="0" lang="fr-FR" sz="2800" spc="-1" strike="noStrike">
+              <a:rPr b="0" lang="en-US" sz="2800" spc="-1" strike="noStrike">
                 <a:latin typeface="Arial"/>
               </a:rPr>
               <a:t>Second Outline Level</a:t>
             </a:r>
-            <a:endParaRPr b="0" lang="fr-FR" sz="2800" spc="-1" strike="noStrike">
+            <a:endParaRPr b="0" lang="en-US" sz="2800" spc="-1" strike="noStrike">
               <a:latin typeface="Arial"/>
             </a:endParaRPr>
           </a:p>
@@ -3660,12 +3660,12 @@
               <a:buChar char=""/>
             </a:pPr>
             <a:r>
-              <a:rPr b="0" lang="fr-FR" sz="2400" spc="-1" strike="noStrike">
+              <a:rPr b="0" lang="en-US" sz="2400" spc="-1" strike="noStrike">
                 <a:latin typeface="Arial"/>
               </a:rPr>
               <a:t>Third Outline Level</a:t>
             </a:r>
-            <a:endParaRPr b="0" lang="fr-FR" sz="2400" spc="-1" strike="noStrike">
+            <a:endParaRPr b="0" lang="en-US" sz="2400" spc="-1" strike="noStrike">
               <a:latin typeface="Arial"/>
             </a:endParaRPr>
           </a:p>
@@ -3682,12 +3682,12 @@
               <a:buChar char=""/>
             </a:pPr>
             <a:r>
-              <a:rPr b="0" lang="fr-FR" sz="2000" spc="-1" strike="noStrike">
+              <a:rPr b="0" lang="en-US" sz="2000" spc="-1" strike="noStrike">
                 <a:latin typeface="Arial"/>
               </a:rPr>
               <a:t>Fourth Outline Level</a:t>
             </a:r>
-            <a:endParaRPr b="0" lang="fr-FR" sz="2000" spc="-1" strike="noStrike">
+            <a:endParaRPr b="0" lang="en-US" sz="2000" spc="-1" strike="noStrike">
               <a:latin typeface="Arial"/>
             </a:endParaRPr>
           </a:p>
@@ -3704,12 +3704,12 @@
               <a:buChar char=""/>
             </a:pPr>
             <a:r>
-              <a:rPr b="0" lang="fr-FR" sz="2000" spc="-1" strike="noStrike">
+              <a:rPr b="0" lang="en-US" sz="2000" spc="-1" strike="noStrike">
                 <a:latin typeface="Arial"/>
               </a:rPr>
               <a:t>Fifth Outline Level</a:t>
             </a:r>
-            <a:endParaRPr b="0" lang="fr-FR" sz="2000" spc="-1" strike="noStrike">
+            <a:endParaRPr b="0" lang="en-US" sz="2000" spc="-1" strike="noStrike">
               <a:latin typeface="Arial"/>
             </a:endParaRPr>
           </a:p>
@@ -3726,12 +3726,12 @@
               <a:buChar char=""/>
             </a:pPr>
             <a:r>
-              <a:rPr b="0" lang="fr-FR" sz="2000" spc="-1" strike="noStrike">
+              <a:rPr b="0" lang="en-US" sz="2000" spc="-1" strike="noStrike">
                 <a:latin typeface="Arial"/>
               </a:rPr>
               <a:t>Sixth Outline Level</a:t>
             </a:r>
-            <a:endParaRPr b="0" lang="fr-FR" sz="2000" spc="-1" strike="noStrike">
+            <a:endParaRPr b="0" lang="en-US" sz="2000" spc="-1" strike="noStrike">
               <a:latin typeface="Arial"/>
             </a:endParaRPr>
           </a:p>
@@ -3748,12 +3748,12 @@
               <a:buChar char=""/>
             </a:pPr>
             <a:r>
-              <a:rPr b="0" lang="fr-FR" sz="2000" spc="-1" strike="noStrike">
+              <a:rPr b="0" lang="en-US" sz="2000" spc="-1" strike="noStrike">
                 <a:latin typeface="Arial"/>
               </a:rPr>
               <a:t>Seventh Outline Level</a:t>
             </a:r>
-            <a:endParaRPr b="0" lang="fr-FR" sz="2000" spc="-1" strike="noStrike">
+            <a:endParaRPr b="0" lang="en-US" sz="2000" spc="-1" strike="noStrike">
               <a:latin typeface="Arial"/>
             </a:endParaRPr>
           </a:p>
@@ -3805,7 +3805,7 @@
         <p:spPr>
           <a:xfrm>
             <a:off x="314280" y="1184400"/>
-            <a:ext cx="8511480" cy="3361680"/>
+            <a:ext cx="8511120" cy="3361320"/>
           </a:xfrm>
           <a:prstGeom prst="rect">
             <a:avLst/>
@@ -3835,7 +3835,7 @@
               </a:spcBef>
               <a:buNone/>
             </a:pPr>
-            <a:endParaRPr b="0" lang="fr-FR" sz="2000" spc="-1" strike="noStrike">
+            <a:endParaRPr b="0" lang="en-US" sz="2000" spc="-1" strike="noStrike">
               <a:latin typeface="Arial"/>
             </a:endParaRPr>
           </a:p>
@@ -3849,7 +3849,7 @@
               </a:spcBef>
               <a:buNone/>
             </a:pPr>
-            <a:endParaRPr b="0" lang="fr-FR" sz="2000" spc="-1" strike="noStrike">
+            <a:endParaRPr b="0" lang="en-US" sz="2000" spc="-1" strike="noStrike">
               <a:latin typeface="Arial"/>
             </a:endParaRPr>
           </a:p>
@@ -3863,7 +3863,7 @@
               </a:spcBef>
               <a:buNone/>
             </a:pPr>
-            <a:endParaRPr b="0" lang="fr-FR" sz="2000" spc="-1" strike="noStrike">
+            <a:endParaRPr b="0" lang="en-US" sz="2000" spc="-1" strike="noStrike">
               <a:latin typeface="Arial"/>
             </a:endParaRPr>
           </a:p>
@@ -3897,7 +3897,7 @@
               </a:rPr>
               <a:t>	</a:t>
             </a:r>
-            <a:endParaRPr b="0" lang="fr-FR" sz="1400" spc="-1" strike="noStrike">
+            <a:endParaRPr b="0" lang="en-US" sz="1400" spc="-1" strike="noStrike">
               <a:latin typeface="Arial"/>
             </a:endParaRPr>
           </a:p>
@@ -3912,7 +3912,7 @@
         <p:spPr>
           <a:xfrm>
             <a:off x="314280" y="267480"/>
-            <a:ext cx="8511480" cy="739800"/>
+            <a:ext cx="8511120" cy="739440"/>
           </a:xfrm>
           <a:prstGeom prst="rect">
             <a:avLst/>
@@ -3949,7 +3949,7 @@
               </a:rPr>
               <a:t>Complexité des opérations sur un tableau ou une liste en Python</a:t>
             </a:r>
-            <a:endParaRPr b="0" lang="fr-FR" sz="2000" spc="-1" strike="noStrike">
+            <a:endParaRPr b="0" lang="en-US" sz="2000" spc="-1" strike="noStrike">
               <a:latin typeface="Arial"/>
             </a:endParaRPr>
           </a:p>
@@ -4021,7 +4021,7 @@
                         </a:rPr>
                         <a:t>tableau (list)</a:t>
                       </a:r>
-                      <a:endParaRPr b="0" lang="fr-FR" sz="1800" spc="-1" strike="noStrike">
+                      <a:endParaRPr b="0" lang="en-US" sz="1800" spc="-1" strike="noStrike">
                         <a:latin typeface="Arial"/>
                       </a:endParaRPr>
                     </a:p>
@@ -4071,7 +4071,7 @@
                         </a:rPr>
                         <a:t>Linked list</a:t>
                       </a:r>
-                      <a:endParaRPr b="0" lang="fr-FR" sz="1800" spc="-1" strike="noStrike">
+                      <a:endParaRPr b="0" lang="en-US" sz="1800" spc="-1" strike="noStrike">
                         <a:latin typeface="Arial"/>
                       </a:endParaRPr>
                     </a:p>
@@ -4141,7 +4141,7 @@
                         </a:rPr>
                         <a:t> élément </a:t>
                       </a:r>
-                      <a:endParaRPr b="0" lang="fr-FR" sz="1500" spc="-1" strike="noStrike">
+                      <a:endParaRPr b="0" lang="en-US" sz="1500" spc="-1" strike="noStrike">
                         <a:latin typeface="Arial"/>
                       </a:endParaRPr>
                     </a:p>
@@ -4193,7 +4193,7 @@
                         </a:rPr>
                         <a:t>O(1)</a:t>
                       </a:r>
-                      <a:endParaRPr b="0" lang="fr-FR" sz="1500" spc="-1" strike="noStrike">
+                      <a:endParaRPr b="0" lang="en-US" sz="1500" spc="-1" strike="noStrike">
                         <a:latin typeface="Arial"/>
                       </a:endParaRPr>
                     </a:p>
@@ -4245,7 +4245,7 @@
                         </a:rPr>
                         <a:t>O(n)</a:t>
                       </a:r>
-                      <a:endParaRPr b="0" lang="fr-FR" sz="1500" spc="-1" strike="noStrike">
+                      <a:endParaRPr b="0" lang="en-US" sz="1500" spc="-1" strike="noStrike">
                         <a:latin typeface="Arial"/>
                       </a:endParaRPr>
                     </a:p>
@@ -4299,7 +4299,7 @@
                         </a:rPr>
                         <a:t>Ajout d’un élément en fin de liste</a:t>
                       </a:r>
-                      <a:endParaRPr b="0" lang="fr-FR" sz="1500" spc="-1" strike="noStrike">
+                      <a:endParaRPr b="0" lang="en-US" sz="1500" spc="-1" strike="noStrike">
                         <a:latin typeface="Arial"/>
                       </a:endParaRPr>
                     </a:p>
@@ -4351,7 +4351,7 @@
                         </a:rPr>
                         <a:t>O(1)</a:t>
                       </a:r>
-                      <a:endParaRPr b="0" lang="fr-FR" sz="1500" spc="-1" strike="noStrike">
+                      <a:endParaRPr b="0" lang="en-US" sz="1500" spc="-1" strike="noStrike">
                         <a:latin typeface="Arial"/>
                       </a:endParaRPr>
                     </a:p>
@@ -4403,7 +4403,7 @@
                         </a:rPr>
                         <a:t>O(n)</a:t>
                       </a:r>
-                      <a:endParaRPr b="0" lang="fr-FR" sz="1500" spc="-1" strike="noStrike">
+                      <a:endParaRPr b="0" lang="en-US" sz="1500" spc="-1" strike="noStrike">
                         <a:latin typeface="Arial"/>
                       </a:endParaRPr>
                     </a:p>
@@ -4457,7 +4457,7 @@
                         </a:rPr>
                         <a:t>Ajout d’un élément en milieu de liste</a:t>
                       </a:r>
-                      <a:endParaRPr b="0" lang="fr-FR" sz="1500" spc="-1" strike="noStrike">
+                      <a:endParaRPr b="0" lang="en-US" sz="1500" spc="-1" strike="noStrike">
                         <a:latin typeface="Arial"/>
                       </a:endParaRPr>
                     </a:p>
@@ -4509,7 +4509,7 @@
                         </a:rPr>
                         <a:t>O(n)</a:t>
                       </a:r>
-                      <a:endParaRPr b="0" lang="fr-FR" sz="1500" spc="-1" strike="noStrike">
+                      <a:endParaRPr b="0" lang="en-US" sz="1500" spc="-1" strike="noStrike">
                         <a:latin typeface="Arial"/>
                       </a:endParaRPr>
                     </a:p>
@@ -4561,7 +4561,7 @@
                         </a:rPr>
                         <a:t>O(n)</a:t>
                       </a:r>
-                      <a:endParaRPr b="0" lang="fr-FR" sz="1500" spc="-1" strike="noStrike">
+                      <a:endParaRPr b="0" lang="en-US" sz="1500" spc="-1" strike="noStrike">
                         <a:latin typeface="Arial"/>
                       </a:endParaRPr>
                     </a:p>
@@ -4618,7 +4618,7 @@
                         </a:rPr>
                         <a:t>Ajout d’un élément en début de liste</a:t>
                       </a:r>
-                      <a:endParaRPr b="0" lang="fr-FR" sz="1500" spc="-1" strike="noStrike">
+                      <a:endParaRPr b="0" lang="en-US" sz="1500" spc="-1" strike="noStrike">
                         <a:latin typeface="Arial"/>
                       </a:endParaRPr>
                     </a:p>
@@ -4670,7 +4670,7 @@
                         </a:rPr>
                         <a:t>O(n)</a:t>
                       </a:r>
-                      <a:endParaRPr b="0" lang="fr-FR" sz="1500" spc="-1" strike="noStrike">
+                      <a:endParaRPr b="0" lang="en-US" sz="1500" spc="-1" strike="noStrike">
                         <a:latin typeface="Arial"/>
                       </a:endParaRPr>
                     </a:p>
@@ -4722,7 +4722,7 @@
                         </a:rPr>
                         <a:t>O(1)</a:t>
                       </a:r>
-                      <a:endParaRPr b="0" lang="fr-FR" sz="1500" spc="-1" strike="noStrike">
+                      <a:endParaRPr b="0" lang="en-US" sz="1500" spc="-1" strike="noStrike">
                         <a:latin typeface="Arial"/>
                       </a:endParaRPr>
                     </a:p>
@@ -4776,7 +4776,7 @@
                         </a:rPr>
                         <a:t>Suppression d’un élément en début de liste</a:t>
                       </a:r>
-                      <a:endParaRPr b="0" lang="fr-FR" sz="1500" spc="-1" strike="noStrike">
+                      <a:endParaRPr b="0" lang="en-US" sz="1500" spc="-1" strike="noStrike">
                         <a:latin typeface="Arial"/>
                       </a:endParaRPr>
                     </a:p>
@@ -4823,7 +4823,7 @@
                         </a:rPr>
                         <a:t>O(n)</a:t>
                       </a:r>
-                      <a:endParaRPr b="0" lang="fr-FR" sz="1500" spc="-1" strike="noStrike">
+                      <a:endParaRPr b="0" lang="en-US" sz="1500" spc="-1" strike="noStrike">
                         <a:latin typeface="Arial"/>
                       </a:endParaRPr>
                     </a:p>
@@ -4870,7 +4870,7 @@
                         </a:rPr>
                         <a:t>O(1)</a:t>
                       </a:r>
-                      <a:endParaRPr b="0" lang="fr-FR" sz="1500" spc="-1" strike="noStrike">
+                      <a:endParaRPr b="0" lang="en-US" sz="1500" spc="-1" strike="noStrike">
                         <a:latin typeface="Arial"/>
                       </a:endParaRPr>
                     </a:p>
@@ -4925,7 +4925,7 @@
                         </a:rPr>
                         <a:t>Suppression d’un élément en milieu de liste</a:t>
                       </a:r>
-                      <a:endParaRPr b="0" lang="fr-FR" sz="1500" spc="-1" strike="noStrike">
+                      <a:endParaRPr b="0" lang="en-US" sz="1500" spc="-1" strike="noStrike">
                         <a:latin typeface="Arial"/>
                       </a:endParaRPr>
                     </a:p>
@@ -4977,7 +4977,7 @@
                         </a:rPr>
                         <a:t>O(n)</a:t>
                       </a:r>
-                      <a:endParaRPr b="0" lang="fr-FR" sz="1500" spc="-1" strike="noStrike">
+                      <a:endParaRPr b="0" lang="en-US" sz="1500" spc="-1" strike="noStrike">
                         <a:latin typeface="Arial"/>
                       </a:endParaRPr>
                     </a:p>
@@ -5029,7 +5029,7 @@
                         </a:rPr>
                         <a:t>O(n)</a:t>
                       </a:r>
-                      <a:endParaRPr b="0" lang="fr-FR" sz="1500" spc="-1" strike="noStrike">
+                      <a:endParaRPr b="0" lang="en-US" sz="1500" spc="-1" strike="noStrike">
                         <a:latin typeface="Arial"/>
                       </a:endParaRPr>
                     </a:p>
@@ -5083,7 +5083,7 @@
                         </a:rPr>
                         <a:t>Suppression d’un élément en fin de liste</a:t>
                       </a:r>
-                      <a:endParaRPr b="0" lang="fr-FR" sz="1500" spc="-1" strike="noStrike">
+                      <a:endParaRPr b="0" lang="en-US" sz="1500" spc="-1" strike="noStrike">
                         <a:latin typeface="Arial"/>
                       </a:endParaRPr>
                     </a:p>
@@ -5133,7 +5133,7 @@
                         </a:rPr>
                         <a:t>O(1)</a:t>
                       </a:r>
-                      <a:endParaRPr b="0" lang="fr-FR" sz="1500" spc="-1" strike="noStrike">
+                      <a:endParaRPr b="0" lang="en-US" sz="1500" spc="-1" strike="noStrike">
                         <a:latin typeface="Arial"/>
                       </a:endParaRPr>
                     </a:p>
@@ -5183,7 +5183,7 @@
                         </a:rPr>
                         <a:t>O(n)</a:t>
                       </a:r>
-                      <a:endParaRPr b="0" lang="fr-FR" sz="1500" spc="-1" strike="noStrike">
+                      <a:endParaRPr b="0" lang="en-US" sz="1500" spc="-1" strike="noStrike">
                         <a:latin typeface="Arial"/>
                       </a:endParaRPr>
                     </a:p>
@@ -5235,7 +5235,7 @@
                         </a:rPr>
                         <a:t>Rechercher une valeur dans la liste</a:t>
                       </a:r>
-                      <a:endParaRPr b="0" lang="fr-FR" sz="1500" spc="-1" strike="noStrike">
+                      <a:endParaRPr b="0" lang="en-US" sz="1500" spc="-1" strike="noStrike">
                         <a:latin typeface="Arial"/>
                       </a:endParaRPr>
                     </a:p>
@@ -5287,7 +5287,7 @@
                         </a:rPr>
                         <a:t>O(n)</a:t>
                       </a:r>
-                      <a:endParaRPr b="0" lang="fr-FR" sz="1500" spc="-1" strike="noStrike">
+                      <a:endParaRPr b="0" lang="en-US" sz="1500" spc="-1" strike="noStrike">
                         <a:latin typeface="Arial"/>
                       </a:endParaRPr>
                     </a:p>
@@ -5339,7 +5339,7 @@
                         </a:rPr>
                         <a:t>O(n)</a:t>
                       </a:r>
-                      <a:endParaRPr b="0" lang="fr-FR" sz="1500" spc="-1" strike="noStrike">
+                      <a:endParaRPr b="0" lang="en-US" sz="1500" spc="-1" strike="noStrike">
                         <a:latin typeface="Arial"/>
                       </a:endParaRPr>
                     </a:p>
@@ -5393,7 +5393,7 @@
                         </a:rPr>
                         <a:t>Rechercher dans une liste triée (dichotomie)</a:t>
                       </a:r>
-                      <a:endParaRPr b="0" lang="fr-FR" sz="1500" spc="-1" strike="noStrike">
+                      <a:endParaRPr b="0" lang="en-US" sz="1500" spc="-1" strike="noStrike">
                         <a:latin typeface="Arial"/>
                       </a:endParaRPr>
                     </a:p>
@@ -5445,7 +5445,7 @@
                         </a:rPr>
                         <a:t>O(log(n))</a:t>
                       </a:r>
-                      <a:endParaRPr b="0" lang="fr-FR" sz="1500" spc="-1" strike="noStrike">
+                      <a:endParaRPr b="0" lang="en-US" sz="1500" spc="-1" strike="noStrike">
                         <a:latin typeface="Arial"/>
                       </a:endParaRPr>
                     </a:p>
@@ -5497,7 +5497,7 @@
                         </a:rPr>
                         <a:t>O(n)</a:t>
                       </a:r>
-                      <a:endParaRPr b="0" lang="fr-FR" sz="1500" spc="-1" strike="noStrike">
+                      <a:endParaRPr b="0" lang="en-US" sz="1500" spc="-1" strike="noStrike">
                         <a:latin typeface="Arial"/>
                       </a:endParaRPr>
                     </a:p>
@@ -5551,7 +5551,7 @@
                         </a:rPr>
                         <a:t>Calcul du nombre d’éléments</a:t>
                       </a:r>
-                      <a:endParaRPr b="0" lang="fr-FR" sz="1500" spc="-1" strike="noStrike">
+                      <a:endParaRPr b="0" lang="en-US" sz="1500" spc="-1" strike="noStrike">
                         <a:latin typeface="Arial"/>
                       </a:endParaRPr>
                     </a:p>
@@ -5600,7 +5600,7 @@
                         </a:rPr>
                         <a:t>O(1)</a:t>
                       </a:r>
-                      <a:endParaRPr b="0" lang="fr-FR" sz="1500" spc="-1" strike="noStrike">
+                      <a:endParaRPr b="0" lang="en-US" sz="1500" spc="-1" strike="noStrike">
                         <a:latin typeface="Arial"/>
                       </a:endParaRPr>
                     </a:p>
@@ -5649,7 +5649,7 @@
                         </a:rPr>
                         <a:t>O(n)</a:t>
                       </a:r>
-                      <a:endParaRPr b="0" lang="fr-FR" sz="1500" spc="-1" strike="noStrike">
+                      <a:endParaRPr b="0" lang="en-US" sz="1500" spc="-1" strike="noStrike">
                         <a:latin typeface="Arial"/>
                       </a:endParaRPr>
                     </a:p>
@@ -5719,7 +5719,7 @@
         <p:spPr>
           <a:xfrm>
             <a:off x="314280" y="1184400"/>
-            <a:ext cx="8511480" cy="3361680"/>
+            <a:ext cx="8511120" cy="3361320"/>
           </a:xfrm>
           <a:prstGeom prst="rect">
             <a:avLst/>
@@ -5749,7 +5749,7 @@
               </a:spcBef>
               <a:buNone/>
             </a:pPr>
-            <a:endParaRPr b="0" lang="fr-FR" sz="2000" spc="-1" strike="noStrike">
+            <a:endParaRPr b="0" lang="en-US" sz="2000" spc="-1" strike="noStrike">
               <a:latin typeface="Arial"/>
             </a:endParaRPr>
           </a:p>
@@ -5763,7 +5763,7 @@
               </a:spcBef>
               <a:buNone/>
             </a:pPr>
-            <a:endParaRPr b="0" lang="fr-FR" sz="2000" spc="-1" strike="noStrike">
+            <a:endParaRPr b="0" lang="en-US" sz="2000" spc="-1" strike="noStrike">
               <a:latin typeface="Arial"/>
             </a:endParaRPr>
           </a:p>
@@ -5777,7 +5777,7 @@
               </a:spcBef>
               <a:buNone/>
             </a:pPr>
-            <a:endParaRPr b="0" lang="fr-FR" sz="2000" spc="-1" strike="noStrike">
+            <a:endParaRPr b="0" lang="en-US" sz="2000" spc="-1" strike="noStrike">
               <a:latin typeface="Arial"/>
             </a:endParaRPr>
           </a:p>
@@ -5811,7 +5811,7 @@
               </a:rPr>
               <a:t>	</a:t>
             </a:r>
-            <a:endParaRPr b="0" lang="fr-FR" sz="1400" spc="-1" strike="noStrike">
+            <a:endParaRPr b="0" lang="en-US" sz="1400" spc="-1" strike="noStrike">
               <a:latin typeface="Arial"/>
             </a:endParaRPr>
           </a:p>
@@ -5826,7 +5826,7 @@
         <p:spPr>
           <a:xfrm>
             <a:off x="314280" y="267480"/>
-            <a:ext cx="8511480" cy="739800"/>
+            <a:ext cx="8511120" cy="739440"/>
           </a:xfrm>
           <a:prstGeom prst="rect">
             <a:avLst/>
@@ -5863,7 +5863,7 @@
               </a:rPr>
               <a:t>Complexité des algorithmes de tri</a:t>
             </a:r>
-            <a:endParaRPr b="0" lang="fr-FR" sz="2000" spc="-1" strike="noStrike">
+            <a:endParaRPr b="0" lang="en-US" sz="2000" spc="-1" strike="noStrike">
               <a:latin typeface="Arial"/>
             </a:endParaRPr>
           </a:p>
@@ -5936,7 +5936,7 @@
                         </a:rPr>
                         <a:t>Complexité temporelle moyenne</a:t>
                       </a:r>
-                      <a:endParaRPr b="0" lang="fr-FR" sz="1800" spc="-1" strike="noStrike">
+                      <a:endParaRPr b="0" lang="en-US" sz="1800" spc="-1" strike="noStrike">
                         <a:latin typeface="Arial"/>
                       </a:endParaRPr>
                     </a:p>
@@ -5990,7 +5990,7 @@
                         </a:rPr>
                         <a:t>Insertion sort</a:t>
                       </a:r>
-                      <a:endParaRPr b="0" lang="fr-FR" sz="1800" spc="-1" strike="noStrike">
+                      <a:endParaRPr b="0" lang="en-US" sz="1800" spc="-1" strike="noStrike">
                         <a:latin typeface="Arial"/>
                       </a:endParaRPr>
                     </a:p>
@@ -6060,7 +6060,7 @@
                         </a:rPr>
                         <a:t>)</a:t>
                       </a:r>
-                      <a:endParaRPr b="0" lang="fr-FR" sz="1800" spc="-1" strike="noStrike">
+                      <a:endParaRPr b="0" lang="en-US" sz="1800" spc="-1" strike="noStrike">
                         <a:latin typeface="Arial"/>
                       </a:endParaRPr>
                     </a:p>
@@ -6114,7 +6114,7 @@
                         </a:rPr>
                         <a:t>Selection sort</a:t>
                       </a:r>
-                      <a:endParaRPr b="0" lang="fr-FR" sz="1800" spc="-1" strike="noStrike">
+                      <a:endParaRPr b="0" lang="en-US" sz="1800" spc="-1" strike="noStrike">
                         <a:latin typeface="Arial"/>
                       </a:endParaRPr>
                     </a:p>
@@ -6184,7 +6184,7 @@
                         </a:rPr>
                         <a:t>)</a:t>
                       </a:r>
-                      <a:endParaRPr b="0" lang="fr-FR" sz="1800" spc="-1" strike="noStrike">
+                      <a:endParaRPr b="0" lang="en-US" sz="1800" spc="-1" strike="noStrike">
                         <a:latin typeface="Arial"/>
                       </a:endParaRPr>
                     </a:p>
@@ -6241,7 +6241,7 @@
                         </a:rPr>
                         <a:t>Merge sort, quick sort, heap sort, tim sort</a:t>
                       </a:r>
-                      <a:endParaRPr b="0" lang="fr-FR" sz="1800" spc="-1" strike="noStrike">
+                      <a:endParaRPr b="0" lang="en-US" sz="1800" spc="-1" strike="noStrike">
                         <a:latin typeface="Arial"/>
                       </a:endParaRPr>
                     </a:p>
@@ -6293,7 +6293,7 @@
                         </a:rPr>
                         <a:t>O(n.log(n))</a:t>
                       </a:r>
-                      <a:endParaRPr b="0" lang="fr-FR" sz="1800" spc="-1" strike="noStrike">
+                      <a:endParaRPr b="0" lang="en-US" sz="1800" spc="-1" strike="noStrike">
                         <a:latin typeface="Arial"/>
                       </a:endParaRPr>
                     </a:p>
@@ -6363,7 +6363,7 @@
         <p:spPr>
           <a:xfrm>
             <a:off x="1152000" y="1634400"/>
-            <a:ext cx="8511480" cy="739800"/>
+            <a:ext cx="8511120" cy="739440"/>
           </a:xfrm>
           <a:prstGeom prst="rect">
             <a:avLst/>
@@ -6400,7 +6400,7 @@
               </a:rPr>
               <a:t>Annexe (pas à retenir)</a:t>
             </a:r>
-            <a:endParaRPr b="0" lang="fr-FR" sz="2000" spc="-1" strike="noStrike">
+            <a:endParaRPr b="0" lang="en-US" sz="2000" spc="-1" strike="noStrike">
               <a:latin typeface="Arial"/>
             </a:endParaRPr>
           </a:p>
@@ -6440,7 +6440,7 @@
         <p:spPr>
           <a:xfrm>
             <a:off x="314280" y="267480"/>
-            <a:ext cx="8511480" cy="739800"/>
+            <a:ext cx="8511120" cy="739440"/>
           </a:xfrm>
           <a:prstGeom prst="rect">
             <a:avLst/>
@@ -6477,7 +6477,7 @@
               </a:rPr>
               <a:t>Complexité</a:t>
             </a:r>
-            <a:endParaRPr b="0" lang="fr-FR" sz="2000" spc="-1" strike="noStrike">
+            <a:endParaRPr b="0" lang="en-US" sz="2000" spc="-1" strike="noStrike">
               <a:latin typeface="Arial"/>
             </a:endParaRPr>
           </a:p>
@@ -6496,7 +6496,7 @@
         <p:spPr>
           <a:xfrm>
             <a:off x="395640" y="843480"/>
-            <a:ext cx="8033400" cy="3327120"/>
+            <a:ext cx="8033040" cy="3326760"/>
           </a:xfrm>
           <a:prstGeom prst="rect">
             <a:avLst/>
@@ -6540,7 +6540,7 @@
         <p:spPr>
           <a:xfrm>
             <a:off x="314280" y="267480"/>
-            <a:ext cx="8511480" cy="739800"/>
+            <a:ext cx="8511120" cy="739440"/>
           </a:xfrm>
           <a:prstGeom prst="rect">
             <a:avLst/>
@@ -6577,7 +6577,7 @@
               </a:rPr>
               <a:t>Complexité des algorithmes</a:t>
             </a:r>
-            <a:endParaRPr b="0" lang="fr-FR" sz="2000" spc="-1" strike="noStrike">
+            <a:endParaRPr b="0" lang="en-US" sz="2000" spc="-1" strike="noStrike">
               <a:latin typeface="Arial"/>
             </a:endParaRPr>
           </a:p>
@@ -6596,7 +6596,7 @@
         <p:spPr>
           <a:xfrm>
             <a:off x="683640" y="1203480"/>
-            <a:ext cx="6229080" cy="3502080"/>
+            <a:ext cx="6228720" cy="3501720"/>
           </a:xfrm>
           <a:prstGeom prst="rect">
             <a:avLst/>

</xml_diff>

<commit_message>
Modifications after lesson 6 on stack/queues
</commit_message>
<xml_diff>
--- a/2023-2024/synthèses de cours/complexités.pptx
+++ b/2023-2024/synthèses de cours/complexités.pptx
@@ -3098,7 +3098,7 @@
         <p:spPr>
           <a:xfrm>
             <a:off x="314280" y="4535640"/>
-            <a:ext cx="270720" cy="330480"/>
+            <a:ext cx="270000" cy="329760"/>
           </a:xfrm>
           <a:prstGeom prst="rect">
             <a:avLst/>
@@ -3128,7 +3128,7 @@
               </a:spcAft>
               <a:buNone/>
             </a:pPr>
-            <a:fld id="{044EFC59-894D-42DE-B3D7-094390F918B9}" type="slidenum">
+            <a:fld id="{2A3617A8-0EC4-4DBD-A917-9B098A527223}" type="slidenum">
               <a:rPr b="0" lang="fr-FR" sz="800" spc="-1" strike="noStrike">
                 <a:solidFill>
                   <a:srgbClr val="000000"/>
@@ -3153,7 +3153,7 @@
         <p:spPr>
           <a:xfrm>
             <a:off x="619560" y="4749120"/>
-            <a:ext cx="360" cy="118800"/>
+            <a:ext cx="360" cy="118080"/>
           </a:xfrm>
           <a:prstGeom prst="rect">
             <a:avLst/>
@@ -3455,7 +3455,7 @@
         <p:spPr>
           <a:xfrm>
             <a:off x="314280" y="4535640"/>
-            <a:ext cx="270720" cy="330480"/>
+            <a:ext cx="270000" cy="329760"/>
           </a:xfrm>
           <a:prstGeom prst="rect">
             <a:avLst/>
@@ -3485,7 +3485,7 @@
               </a:spcAft>
               <a:buNone/>
             </a:pPr>
-            <a:fld id="{88FDEA14-A393-447A-8334-E743B95EFC87}" type="slidenum">
+            <a:fld id="{48CBA8AF-1B0D-4B85-84C6-945D8B8375B8}" type="slidenum">
               <a:rPr b="0" lang="fr-FR" sz="800" spc="-1" strike="noStrike">
                 <a:solidFill>
                   <a:srgbClr val="000000"/>
@@ -3510,7 +3510,7 @@
         <p:spPr>
           <a:xfrm>
             <a:off x="619560" y="4749120"/>
-            <a:ext cx="360" cy="118800"/>
+            <a:ext cx="360" cy="118080"/>
           </a:xfrm>
           <a:prstGeom prst="rect">
             <a:avLst/>
@@ -3805,7 +3805,7 @@
         <p:spPr>
           <a:xfrm>
             <a:off x="314280" y="1184400"/>
-            <a:ext cx="8511120" cy="3361320"/>
+            <a:ext cx="8510400" cy="3360600"/>
           </a:xfrm>
           <a:prstGeom prst="rect">
             <a:avLst/>
@@ -3912,7 +3912,7 @@
         <p:spPr>
           <a:xfrm>
             <a:off x="314280" y="267480"/>
-            <a:ext cx="8511120" cy="739440"/>
+            <a:ext cx="8510400" cy="738720"/>
           </a:xfrm>
           <a:prstGeom prst="rect">
             <a:avLst/>
@@ -3963,7 +3963,7 @@
         </p:nvGraphicFramePr>
         <p:xfrm>
           <a:off x="508320" y="657360"/>
-          <a:ext cx="7031160" cy="4078440"/>
+          <a:ext cx="8221320" cy="4078440"/>
         </p:xfrm>
         <a:graphic>
           <a:graphicData uri="http://schemas.openxmlformats.org/drawingml/2006/table">
@@ -3972,6 +3972,7 @@
               <a:tblGrid>
                 <a:gridCol w="4245840"/>
                 <a:gridCol w="1595520"/>
+                <a:gridCol w="1190160"/>
                 <a:gridCol w="1190160"/>
               </a:tblGrid>
               <a:tr h="370800">
@@ -4073,6 +4074,59 @@
                       </a:r>
                       <a:endParaRPr b="0" lang="en-US" sz="1800" spc="-1" strike="noStrike">
                         <a:latin typeface="Arial"/>
+                      </a:endParaRPr>
+                    </a:p>
+                  </a:txBody>
+                  <a:tcPr anchor="t" marL="91440" marR="91440">
+                    <a:lnL w="12240">
+                      <a:solidFill>
+                        <a:srgbClr val="ffffff"/>
+                      </a:solidFill>
+                    </a:lnL>
+                    <a:lnR w="12240">
+                      <a:solidFill>
+                        <a:srgbClr val="ffffff"/>
+                      </a:solidFill>
+                    </a:lnR>
+                    <a:lnT w="12240">
+                      <a:solidFill>
+                        <a:srgbClr val="ffffff"/>
+                      </a:solidFill>
+                    </a:lnT>
+                    <a:lnB>
+                      <a:noFill/>
+                    </a:lnB>
+                    <a:solidFill>
+                      <a:srgbClr val="ff7900"/>
+                    </a:solidFill>
+                  </a:tcPr>
+                </a:tc>
+                <a:tc>
+                  <a:txBody>
+                    <a:bodyPr anchor="t">
+                      <a:noAutofit/>
+                    </a:bodyPr>
+                    <a:p>
+                      <a:pPr marL="216000" indent="-216000">
+                        <a:lnSpc>
+                          <a:spcPct val="100000"/>
+                        </a:lnSpc>
+                      </a:pPr>
+                      <a:r>
+                        <a:rPr b="1" lang="fr-FR" sz="1800" spc="-1" strike="noStrike">
+                          <a:solidFill>
+                            <a:srgbClr val="ffffff"/>
+                          </a:solidFill>
+                          <a:latin typeface="Arial"/>
+                        </a:rPr>
+                        <a:t>Doubly linked list</a:t>
+                      </a:r>
+                      <a:endParaRPr b="1" lang="fr-FR" sz="1800" spc="-1" strike="noStrike">
+                        <a:solidFill>
+                          <a:srgbClr val="ffffff"/>
+                        </a:solidFill>
+                        <a:latin typeface="Arial"/>
+                        <a:ea typeface="Noto Sans CJK SC"/>
                       </a:endParaRPr>
                     </a:p>
                   </a:txBody>
@@ -4256,10 +4310,58 @@
                         <a:srgbClr val="ffffff"/>
                       </a:solidFill>
                     </a:lnL>
-                    <a:lnR w="12240">
-                      <a:solidFill>
-                        <a:srgbClr val="ffffff"/>
-                      </a:solidFill>
+                    <a:lnR>
+                      <a:noFill/>
+                    </a:lnR>
+                    <a:lnT w="12240">
+                      <a:solidFill>
+                        <a:srgbClr val="ffffff"/>
+                      </a:solidFill>
+                    </a:lnT>
+                    <a:lnB w="12240">
+                      <a:solidFill>
+                        <a:srgbClr val="ffffff"/>
+                      </a:solidFill>
+                    </a:lnB>
+                    <a:solidFill>
+                      <a:srgbClr val="ffd6cc"/>
+                    </a:solidFill>
+                  </a:tcPr>
+                </a:tc>
+                <a:tc>
+                  <a:txBody>
+                    <a:bodyPr anchor="t">
+                      <a:noAutofit/>
+                    </a:bodyPr>
+                    <a:p>
+                      <a:pPr>
+                        <a:lnSpc>
+                          <a:spcPct val="100000"/>
+                        </a:lnSpc>
+                        <a:buNone/>
+                      </a:pPr>
+                      <a:r>
+                        <a:rPr b="0" lang="fr-FR" sz="1500" spc="-1" strike="noStrike">
+                          <a:solidFill>
+                            <a:srgbClr val="000000"/>
+                          </a:solidFill>
+                          <a:latin typeface="Arial"/>
+                        </a:rPr>
+                        <a:t>O(n)</a:t>
+                      </a:r>
+                      <a:endParaRPr b="0" lang="en-US" sz="1500" spc="-1" strike="noStrike">
+                        <a:latin typeface="Times New Roman"/>
+                      </a:endParaRPr>
+                    </a:p>
+                  </a:txBody>
+                  <a:tcPr anchor="t" marL="91440" marR="91440">
+                    <a:lnL w="12240">
+                      <a:solidFill>
+                        <a:srgbClr val="ffffff"/>
+                      </a:solidFill>
+                    </a:lnL>
+                    <a:lnR>
+                      <a:noFill/>
                     </a:lnR>
                     <a:lnT w="12240">
                       <a:solidFill>
@@ -4414,15 +4516,63 @@
                         <a:srgbClr val="ffffff"/>
                       </a:solidFill>
                     </a:lnL>
-                    <a:lnR w="12240">
-                      <a:solidFill>
-                        <a:srgbClr val="ffffff"/>
-                      </a:solidFill>
+                    <a:lnR>
+                      <a:noFill/>
                     </a:lnR>
                     <a:lnT w="12240">
                       <a:solidFill>
                         <a:srgbClr val="ffffff"/>
                       </a:solidFill>
+                    </a:lnT>
+                    <a:lnB w="12240">
+                      <a:solidFill>
+                        <a:srgbClr val="ffffff"/>
+                      </a:solidFill>
+                    </a:lnB>
+                    <a:solidFill>
+                      <a:srgbClr val="ffebe7"/>
+                    </a:solidFill>
+                  </a:tcPr>
+                </a:tc>
+                <a:tc>
+                  <a:txBody>
+                    <a:bodyPr anchor="t">
+                      <a:noAutofit/>
+                    </a:bodyPr>
+                    <a:p>
+                      <a:pPr>
+                        <a:lnSpc>
+                          <a:spcPct val="100000"/>
+                        </a:lnSpc>
+                        <a:buNone/>
+                      </a:pPr>
+                      <a:r>
+                        <a:rPr b="0" lang="fr-FR" sz="1500" spc="-1" strike="noStrike">
+                          <a:solidFill>
+                            <a:srgbClr val="000000"/>
+                          </a:solidFill>
+                          <a:latin typeface="Arial"/>
+                        </a:rPr>
+                        <a:t>O(1)</a:t>
+                      </a:r>
+                      <a:endParaRPr b="0" lang="en-US" sz="1500" spc="-1" strike="noStrike">
+                        <a:latin typeface="Times New Roman"/>
+                      </a:endParaRPr>
+                    </a:p>
+                  </a:txBody>
+                  <a:tcPr anchor="t" marL="91440" marR="91440">
+                    <a:lnL w="12240">
+                      <a:solidFill>
+                        <a:srgbClr val="ffffff"/>
+                      </a:solidFill>
+                    </a:lnL>
+                    <a:lnR w="12240">
+                      <a:solidFill>
+                        <a:srgbClr val="ffffff"/>
+                      </a:solidFill>
+                    </a:lnR>
+                    <a:lnT>
+                      <a:noFill/>
                     </a:lnT>
                     <a:lnB w="12240">
                       <a:solidFill>
@@ -4572,10 +4722,58 @@
                         <a:srgbClr val="ffffff"/>
                       </a:solidFill>
                     </a:lnL>
-                    <a:lnR w="12240">
-                      <a:solidFill>
-                        <a:srgbClr val="ffffff"/>
-                      </a:solidFill>
+                    <a:lnR>
+                      <a:noFill/>
+                    </a:lnR>
+                    <a:lnT w="12240">
+                      <a:solidFill>
+                        <a:srgbClr val="ffffff"/>
+                      </a:solidFill>
+                    </a:lnT>
+                    <a:lnB w="12240">
+                      <a:solidFill>
+                        <a:srgbClr val="ffffff"/>
+                      </a:solidFill>
+                    </a:lnB>
+                    <a:solidFill>
+                      <a:srgbClr val="ffd6cc"/>
+                    </a:solidFill>
+                  </a:tcPr>
+                </a:tc>
+                <a:tc>
+                  <a:txBody>
+                    <a:bodyPr anchor="t">
+                      <a:noAutofit/>
+                    </a:bodyPr>
+                    <a:p>
+                      <a:pPr>
+                        <a:lnSpc>
+                          <a:spcPct val="100000"/>
+                        </a:lnSpc>
+                        <a:buNone/>
+                      </a:pPr>
+                      <a:r>
+                        <a:rPr b="0" lang="fr-FR" sz="1500" spc="-1" strike="noStrike">
+                          <a:solidFill>
+                            <a:srgbClr val="000000"/>
+                          </a:solidFill>
+                          <a:latin typeface="Arial"/>
+                        </a:rPr>
+                        <a:t>O(n)</a:t>
+                      </a:r>
+                      <a:endParaRPr b="0" lang="en-US" sz="1500" spc="-1" strike="noStrike">
+                        <a:latin typeface="Times New Roman"/>
+                      </a:endParaRPr>
+                    </a:p>
+                  </a:txBody>
+                  <a:tcPr anchor="t" marL="91440" marR="91440">
+                    <a:lnL w="12240">
+                      <a:solidFill>
+                        <a:srgbClr val="ffffff"/>
+                      </a:solidFill>
+                    </a:lnL>
+                    <a:lnR>
+                      <a:noFill/>
                     </a:lnR>
                     <a:lnT w="12240">
                       <a:solidFill>
@@ -4733,15 +4931,63 @@
                         <a:srgbClr val="ffffff"/>
                       </a:solidFill>
                     </a:lnL>
-                    <a:lnR w="12240">
-                      <a:solidFill>
-                        <a:srgbClr val="ffffff"/>
-                      </a:solidFill>
+                    <a:lnR>
+                      <a:noFill/>
                     </a:lnR>
                     <a:lnT w="12240">
                       <a:solidFill>
                         <a:srgbClr val="ffffff"/>
                       </a:solidFill>
+                    </a:lnT>
+                    <a:lnB w="12240">
+                      <a:solidFill>
+                        <a:srgbClr val="ffffff"/>
+                      </a:solidFill>
+                    </a:lnB>
+                    <a:solidFill>
+                      <a:srgbClr val="ffebe7"/>
+                    </a:solidFill>
+                  </a:tcPr>
+                </a:tc>
+                <a:tc>
+                  <a:txBody>
+                    <a:bodyPr anchor="t">
+                      <a:noAutofit/>
+                    </a:bodyPr>
+                    <a:p>
+                      <a:pPr>
+                        <a:lnSpc>
+                          <a:spcPct val="100000"/>
+                        </a:lnSpc>
+                        <a:buNone/>
+                      </a:pPr>
+                      <a:r>
+                        <a:rPr b="0" lang="fr-FR" sz="1500" spc="-1" strike="noStrike">
+                          <a:solidFill>
+                            <a:srgbClr val="000000"/>
+                          </a:solidFill>
+                          <a:latin typeface="Arial"/>
+                        </a:rPr>
+                        <a:t>O(1)</a:t>
+                      </a:r>
+                      <a:endParaRPr b="0" lang="en-US" sz="1500" spc="-1" strike="noStrike">
+                        <a:latin typeface="Times New Roman"/>
+                      </a:endParaRPr>
+                    </a:p>
+                  </a:txBody>
+                  <a:tcPr anchor="t" marL="91440" marR="91440">
+                    <a:lnL w="12240">
+                      <a:solidFill>
+                        <a:srgbClr val="ffffff"/>
+                      </a:solidFill>
+                    </a:lnL>
+                    <a:lnR w="12240">
+                      <a:solidFill>
+                        <a:srgbClr val="ffffff"/>
+                      </a:solidFill>
+                    </a:lnR>
+                    <a:lnT>
+                      <a:noFill/>
                     </a:lnT>
                     <a:lnB w="12240">
                       <a:solidFill>
@@ -4881,10 +5127,8 @@
                         <a:srgbClr val="ffffff"/>
                       </a:solidFill>
                     </a:lnL>
-                    <a:lnR w="12240">
-                      <a:solidFill>
-                        <a:srgbClr val="ffffff"/>
-                      </a:solidFill>
+                    <a:lnR>
+                      <a:noFill/>
                     </a:lnR>
                     <a:lnT w="12240">
                       <a:solidFill>
@@ -4896,6 +5140,56 @@
                     </a:lnB>
                     <a:solidFill>
                       <a:srgbClr val="ffd6cc"/>
+                    </a:solidFill>
+                  </a:tcPr>
+                </a:tc>
+                <a:tc>
+                  <a:txBody>
+                    <a:bodyPr anchor="t">
+                      <a:noAutofit/>
+                    </a:bodyPr>
+                    <a:p>
+                      <a:pPr>
+                        <a:lnSpc>
+                          <a:spcPct val="100000"/>
+                        </a:lnSpc>
+                        <a:buNone/>
+                      </a:pPr>
+                      <a:r>
+                        <a:rPr b="0" lang="fr-FR" sz="1500" spc="-1" strike="noStrike">
+                          <a:solidFill>
+                            <a:srgbClr val="000000"/>
+                          </a:solidFill>
+                          <a:latin typeface="Arial"/>
+                        </a:rPr>
+                        <a:t>O(1)</a:t>
+                      </a:r>
+                      <a:endParaRPr b="0" lang="en-US" sz="1500" spc="-1" strike="noStrike">
+                        <a:latin typeface="Times New Roman"/>
+                      </a:endParaRPr>
+                    </a:p>
+                  </a:txBody>
+                  <a:tcPr anchor="t" marL="91440" marR="91440">
+                    <a:lnL w="12240">
+                      <a:solidFill>
+                        <a:srgbClr val="ffffff"/>
+                      </a:solidFill>
+                    </a:lnL>
+                    <a:lnR w="12240">
+                      <a:solidFill>
+                        <a:srgbClr val="ffffff"/>
+                      </a:solidFill>
+                    </a:lnR>
+                    <a:lnT>
+                      <a:noFill/>
+                    </a:lnT>
+                    <a:lnB w="12240">
+                      <a:solidFill>
+                        <a:srgbClr val="ffffff"/>
+                      </a:solidFill>
+                    </a:lnB>
+                    <a:solidFill>
+                      <a:srgbClr val="ffebe7"/>
                     </a:solidFill>
                   </a:tcPr>
                 </a:tc>
@@ -5040,10 +5334,8 @@
                         <a:srgbClr val="ffffff"/>
                       </a:solidFill>
                     </a:lnL>
-                    <a:lnR w="12240">
-                      <a:solidFill>
-                        <a:srgbClr val="ffffff"/>
-                      </a:solidFill>
+                    <a:lnR>
+                      <a:noFill/>
                     </a:lnR>
                     <a:lnT w="12240">
                       <a:solidFill>
@@ -5057,6 +5349,56 @@
                     </a:lnB>
                     <a:solidFill>
                       <a:srgbClr val="ffebe7"/>
+                    </a:solidFill>
+                  </a:tcPr>
+                </a:tc>
+                <a:tc>
+                  <a:txBody>
+                    <a:bodyPr anchor="t">
+                      <a:noAutofit/>
+                    </a:bodyPr>
+                    <a:p>
+                      <a:pPr>
+                        <a:lnSpc>
+                          <a:spcPct val="100000"/>
+                        </a:lnSpc>
+                        <a:buNone/>
+                      </a:pPr>
+                      <a:r>
+                        <a:rPr b="0" lang="fr-FR" sz="1500" spc="-1" strike="noStrike">
+                          <a:solidFill>
+                            <a:srgbClr val="000000"/>
+                          </a:solidFill>
+                          <a:latin typeface="Arial"/>
+                        </a:rPr>
+                        <a:t>O(n)</a:t>
+                      </a:r>
+                      <a:endParaRPr b="0" lang="en-US" sz="1500" spc="-1" strike="noStrike">
+                        <a:latin typeface="Times New Roman"/>
+                      </a:endParaRPr>
+                    </a:p>
+                  </a:txBody>
+                  <a:tcPr anchor="t" marL="91440" marR="91440">
+                    <a:lnL w="12240">
+                      <a:solidFill>
+                        <a:srgbClr val="ffffff"/>
+                      </a:solidFill>
+                    </a:lnL>
+                    <a:lnR>
+                      <a:noFill/>
+                    </a:lnR>
+                    <a:lnT w="12240">
+                      <a:solidFill>
+                        <a:srgbClr val="ffffff"/>
+                      </a:solidFill>
+                    </a:lnT>
+                    <a:lnB w="12240">
+                      <a:solidFill>
+                        <a:srgbClr val="ffffff"/>
+                      </a:solidFill>
+                    </a:lnB>
+                    <a:solidFill>
+                      <a:srgbClr val="ffd6cc"/>
                     </a:solidFill>
                   </a:tcPr>
                 </a:tc>
@@ -5185,6 +5527,54 @@
                       </a:r>
                       <a:endParaRPr b="0" lang="en-US" sz="1500" spc="-1" strike="noStrike">
                         <a:latin typeface="Arial"/>
+                      </a:endParaRPr>
+                    </a:p>
+                  </a:txBody>
+                  <a:tcPr anchor="t" marL="91440" marR="91440">
+                    <a:lnL w="12240">
+                      <a:solidFill>
+                        <a:srgbClr val="ffffff"/>
+                      </a:solidFill>
+                    </a:lnL>
+                    <a:lnR>
+                      <a:noFill/>
+                    </a:lnR>
+                    <a:lnT>
+                      <a:noFill/>
+                    </a:lnT>
+                    <a:lnB w="12240">
+                      <a:solidFill>
+                        <a:srgbClr val="ffffff"/>
+                      </a:solidFill>
+                    </a:lnB>
+                    <a:solidFill>
+                      <a:srgbClr val="ffebe7"/>
+                    </a:solidFill>
+                  </a:tcPr>
+                </a:tc>
+                <a:tc>
+                  <a:txBody>
+                    <a:bodyPr anchor="t">
+                      <a:noAutofit/>
+                    </a:bodyPr>
+                    <a:p>
+                      <a:pPr>
+                        <a:lnSpc>
+                          <a:spcPct val="100000"/>
+                        </a:lnSpc>
+                        <a:buNone/>
+                      </a:pPr>
+                      <a:r>
+                        <a:rPr b="0" lang="fr-FR" sz="1500" spc="-1" strike="noStrike">
+                          <a:solidFill>
+                            <a:srgbClr val="000000"/>
+                          </a:solidFill>
+                          <a:latin typeface="Arial"/>
+                        </a:rPr>
+                        <a:t>O(1)</a:t>
+                      </a:r>
+                      <a:endParaRPr b="0" lang="en-US" sz="1500" spc="-1" strike="noStrike">
+                        <a:latin typeface="Times New Roman"/>
                       </a:endParaRPr>
                     </a:p>
                   </a:txBody>
@@ -5350,10 +5740,8 @@
                         <a:srgbClr val="ffffff"/>
                       </a:solidFill>
                     </a:lnL>
-                    <a:lnR w="12240">
-                      <a:solidFill>
-                        <a:srgbClr val="ffffff"/>
-                      </a:solidFill>
+                    <a:lnR>
+                      <a:noFill/>
                     </a:lnR>
                     <a:lnT w="12240">
                       <a:solidFill>
@@ -5367,6 +5755,56 @@
                     </a:lnB>
                     <a:solidFill>
                       <a:srgbClr val="ffebe7"/>
+                    </a:solidFill>
+                  </a:tcPr>
+                </a:tc>
+                <a:tc>
+                  <a:txBody>
+                    <a:bodyPr anchor="t">
+                      <a:noAutofit/>
+                    </a:bodyPr>
+                    <a:p>
+                      <a:pPr>
+                        <a:lnSpc>
+                          <a:spcPct val="100000"/>
+                        </a:lnSpc>
+                        <a:buNone/>
+                      </a:pPr>
+                      <a:r>
+                        <a:rPr b="0" lang="fr-FR" sz="1500" spc="-1" strike="noStrike">
+                          <a:solidFill>
+                            <a:srgbClr val="000000"/>
+                          </a:solidFill>
+                          <a:latin typeface="Arial"/>
+                        </a:rPr>
+                        <a:t>O(n)</a:t>
+                      </a:r>
+                      <a:endParaRPr b="0" lang="en-US" sz="1500" spc="-1" strike="noStrike">
+                        <a:latin typeface="Times New Roman"/>
+                      </a:endParaRPr>
+                    </a:p>
+                  </a:txBody>
+                  <a:tcPr anchor="t" marL="91440" marR="91440">
+                    <a:lnL w="12240">
+                      <a:solidFill>
+                        <a:srgbClr val="ffffff"/>
+                      </a:solidFill>
+                    </a:lnL>
+                    <a:lnR>
+                      <a:noFill/>
+                    </a:lnR>
+                    <a:lnT w="12240">
+                      <a:solidFill>
+                        <a:srgbClr val="ffffff"/>
+                      </a:solidFill>
+                    </a:lnT>
+                    <a:lnB w="12240">
+                      <a:solidFill>
+                        <a:srgbClr val="ffffff"/>
+                      </a:solidFill>
+                    </a:lnB>
+                    <a:solidFill>
+                      <a:srgbClr val="ffd6cc"/>
                     </a:solidFill>
                   </a:tcPr>
                 </a:tc>
@@ -5508,10 +5946,8 @@
                         <a:srgbClr val="ffffff"/>
                       </a:solidFill>
                     </a:lnL>
-                    <a:lnR w="12240">
-                      <a:solidFill>
-                        <a:srgbClr val="ffffff"/>
-                      </a:solidFill>
+                    <a:lnR>
+                      <a:noFill/>
                     </a:lnR>
                     <a:lnT w="12240">
                       <a:solidFill>
@@ -5525,6 +5961,56 @@
                     </a:lnB>
                     <a:solidFill>
                       <a:srgbClr val="ffebe7"/>
+                    </a:solidFill>
+                  </a:tcPr>
+                </a:tc>
+                <a:tc>
+                  <a:txBody>
+                    <a:bodyPr anchor="t">
+                      <a:noAutofit/>
+                    </a:bodyPr>
+                    <a:p>
+                      <a:pPr>
+                        <a:lnSpc>
+                          <a:spcPct val="100000"/>
+                        </a:lnSpc>
+                        <a:buNone/>
+                      </a:pPr>
+                      <a:r>
+                        <a:rPr b="0" lang="fr-FR" sz="1500" spc="-1" strike="noStrike">
+                          <a:solidFill>
+                            <a:srgbClr val="000000"/>
+                          </a:solidFill>
+                          <a:latin typeface="Arial"/>
+                        </a:rPr>
+                        <a:t>O(n)</a:t>
+                      </a:r>
+                      <a:endParaRPr b="0" lang="en-US" sz="1500" spc="-1" strike="noStrike">
+                        <a:latin typeface="Times New Roman"/>
+                      </a:endParaRPr>
+                    </a:p>
+                  </a:txBody>
+                  <a:tcPr anchor="t" marL="91440" marR="91440">
+                    <a:lnL w="12240">
+                      <a:solidFill>
+                        <a:srgbClr val="ffffff"/>
+                      </a:solidFill>
+                    </a:lnL>
+                    <a:lnR>
+                      <a:noFill/>
+                    </a:lnR>
+                    <a:lnT w="12240">
+                      <a:solidFill>
+                        <a:srgbClr val="ffffff"/>
+                      </a:solidFill>
+                    </a:lnT>
+                    <a:lnB w="12240">
+                      <a:solidFill>
+                        <a:srgbClr val="ffffff"/>
+                      </a:solidFill>
+                    </a:lnB>
+                    <a:solidFill>
+                      <a:srgbClr val="ffd6cc"/>
                     </a:solidFill>
                   </a:tcPr>
                 </a:tc>
@@ -5660,10 +6146,8 @@
                         <a:srgbClr val="ffffff"/>
                       </a:solidFill>
                     </a:lnL>
-                    <a:lnR w="12240">
-                      <a:solidFill>
-                        <a:srgbClr val="ffffff"/>
-                      </a:solidFill>
+                    <a:lnR>
+                      <a:noFill/>
                     </a:lnR>
                     <a:lnT w="12240">
                       <a:solidFill>
@@ -5677,6 +6161,56 @@
                     </a:lnB>
                     <a:solidFill>
                       <a:srgbClr val="ffebe7"/>
+                    </a:solidFill>
+                  </a:tcPr>
+                </a:tc>
+                <a:tc>
+                  <a:txBody>
+                    <a:bodyPr anchor="t">
+                      <a:noAutofit/>
+                    </a:bodyPr>
+                    <a:p>
+                      <a:pPr>
+                        <a:lnSpc>
+                          <a:spcPct val="100000"/>
+                        </a:lnSpc>
+                        <a:buNone/>
+                      </a:pPr>
+                      <a:r>
+                        <a:rPr b="0" lang="fr-FR" sz="1500" spc="-1" strike="noStrike">
+                          <a:solidFill>
+                            <a:srgbClr val="000000"/>
+                          </a:solidFill>
+                          <a:latin typeface="Arial"/>
+                        </a:rPr>
+                        <a:t>O(n)</a:t>
+                      </a:r>
+                      <a:endParaRPr b="0" lang="en-US" sz="1500" spc="-1" strike="noStrike">
+                        <a:latin typeface="Times New Roman"/>
+                      </a:endParaRPr>
+                    </a:p>
+                  </a:txBody>
+                  <a:tcPr anchor="t" marL="91440" marR="91440">
+                    <a:lnL w="12240">
+                      <a:solidFill>
+                        <a:srgbClr val="ffffff"/>
+                      </a:solidFill>
+                    </a:lnL>
+                    <a:lnR>
+                      <a:noFill/>
+                    </a:lnR>
+                    <a:lnT w="12240">
+                      <a:solidFill>
+                        <a:srgbClr val="ffffff"/>
+                      </a:solidFill>
+                    </a:lnT>
+                    <a:lnB w="12240">
+                      <a:solidFill>
+                        <a:srgbClr val="ffffff"/>
+                      </a:solidFill>
+                    </a:lnB>
+                    <a:solidFill>
+                      <a:srgbClr val="ffd6cc"/>
                     </a:solidFill>
                   </a:tcPr>
                 </a:tc>
@@ -5719,7 +6253,7 @@
         <p:spPr>
           <a:xfrm>
             <a:off x="314280" y="1184400"/>
-            <a:ext cx="8511120" cy="3361320"/>
+            <a:ext cx="8510400" cy="3360600"/>
           </a:xfrm>
           <a:prstGeom prst="rect">
             <a:avLst/>
@@ -5826,7 +6360,7 @@
         <p:spPr>
           <a:xfrm>
             <a:off x="314280" y="267480"/>
-            <a:ext cx="8511120" cy="739440"/>
+            <a:ext cx="8510400" cy="738720"/>
           </a:xfrm>
           <a:prstGeom prst="rect">
             <a:avLst/>
@@ -6363,7 +6897,7 @@
         <p:spPr>
           <a:xfrm>
             <a:off x="1152000" y="1634400"/>
-            <a:ext cx="8511120" cy="739440"/>
+            <a:ext cx="8510400" cy="738720"/>
           </a:xfrm>
           <a:prstGeom prst="rect">
             <a:avLst/>
@@ -6440,7 +6974,7 @@
         <p:spPr>
           <a:xfrm>
             <a:off x="314280" y="267480"/>
-            <a:ext cx="8511120" cy="739440"/>
+            <a:ext cx="8510400" cy="738720"/>
           </a:xfrm>
           <a:prstGeom prst="rect">
             <a:avLst/>
@@ -6496,7 +7030,7 @@
         <p:spPr>
           <a:xfrm>
             <a:off x="395640" y="843480"/>
-            <a:ext cx="8033040" cy="3326760"/>
+            <a:ext cx="8032320" cy="3326040"/>
           </a:xfrm>
           <a:prstGeom prst="rect">
             <a:avLst/>
@@ -6540,7 +7074,7 @@
         <p:spPr>
           <a:xfrm>
             <a:off x="314280" y="267480"/>
-            <a:ext cx="8511120" cy="739440"/>
+            <a:ext cx="8510400" cy="738720"/>
           </a:xfrm>
           <a:prstGeom prst="rect">
             <a:avLst/>
@@ -6596,7 +7130,7 @@
         <p:spPr>
           <a:xfrm>
             <a:off x="683640" y="1203480"/>
-            <a:ext cx="6228720" cy="3501720"/>
+            <a:ext cx="6228000" cy="3501000"/>
           </a:xfrm>
           <a:prstGeom prst="rect">
             <a:avLst/>

</xml_diff>

<commit_message>
Add powerpoints for S2
</commit_message>
<xml_diff>
--- a/2023-2024/synthèses de cours/complexités.pptx
+++ b/2023-2024/synthèses de cours/complexités.pptx
@@ -11,6 +11,7 @@
     <p:sldId id="258" r:id="rId6"/>
     <p:sldId id="259" r:id="rId7"/>
     <p:sldId id="260" r:id="rId8"/>
+    <p:sldId id="261" r:id="rId9"/>
   </p:sldIdLst>
   <p:sldSz cx="9144000" cy="5143500"/>
   <p:notesSz cx="7772400" cy="10058400"/>
@@ -3098,7 +3099,7 @@
         <p:spPr>
           <a:xfrm>
             <a:off x="314280" y="4535640"/>
-            <a:ext cx="270000" cy="329760"/>
+            <a:ext cx="269280" cy="329040"/>
           </a:xfrm>
           <a:prstGeom prst="rect">
             <a:avLst/>
@@ -3128,7 +3129,7 @@
               </a:spcAft>
               <a:buNone/>
             </a:pPr>
-            <a:fld id="{2A3617A8-0EC4-4DBD-A917-9B098A527223}" type="slidenum">
+            <a:fld id="{6D0EB6DC-9D42-45D5-87B9-AFE30936AA28}" type="slidenum">
               <a:rPr b="0" lang="fr-FR" sz="800" spc="-1" strike="noStrike">
                 <a:solidFill>
                   <a:srgbClr val="000000"/>
@@ -3153,7 +3154,7 @@
         <p:spPr>
           <a:xfrm>
             <a:off x="619560" y="4749120"/>
-            <a:ext cx="360" cy="118080"/>
+            <a:ext cx="360" cy="117360"/>
           </a:xfrm>
           <a:prstGeom prst="rect">
             <a:avLst/>
@@ -3455,7 +3456,7 @@
         <p:spPr>
           <a:xfrm>
             <a:off x="314280" y="4535640"/>
-            <a:ext cx="270000" cy="329760"/>
+            <a:ext cx="269280" cy="329040"/>
           </a:xfrm>
           <a:prstGeom prst="rect">
             <a:avLst/>
@@ -3485,7 +3486,7 @@
               </a:spcAft>
               <a:buNone/>
             </a:pPr>
-            <a:fld id="{48CBA8AF-1B0D-4B85-84C6-945D8B8375B8}" type="slidenum">
+            <a:fld id="{D4AE8E55-045E-4FE2-9BB6-9F1121966731}" type="slidenum">
               <a:rPr b="0" lang="fr-FR" sz="800" spc="-1" strike="noStrike">
                 <a:solidFill>
                   <a:srgbClr val="000000"/>
@@ -3510,7 +3511,7 @@
         <p:spPr>
           <a:xfrm>
             <a:off x="619560" y="4749120"/>
-            <a:ext cx="360" cy="118080"/>
+            <a:ext cx="360" cy="117360"/>
           </a:xfrm>
           <a:prstGeom prst="rect">
             <a:avLst/>
@@ -3805,7 +3806,7 @@
         <p:spPr>
           <a:xfrm>
             <a:off x="314280" y="1184400"/>
-            <a:ext cx="8510400" cy="3360600"/>
+            <a:ext cx="8509680" cy="3359880"/>
           </a:xfrm>
           <a:prstGeom prst="rect">
             <a:avLst/>
@@ -3912,7 +3913,7 @@
         <p:spPr>
           <a:xfrm>
             <a:off x="314280" y="267480"/>
-            <a:ext cx="8510400" cy="738720"/>
+            <a:ext cx="8509680" cy="738000"/>
           </a:xfrm>
           <a:prstGeom prst="rect">
             <a:avLst/>
@@ -4111,6 +4112,10 @@
                         <a:lnSpc>
                           <a:spcPct val="100000"/>
                         </a:lnSpc>
+                        <a:buNone/>
+                        <a:tabLst>
+                          <a:tab algn="l" pos="0"/>
+                        </a:tabLst>
                       </a:pPr>
                       <a:r>
                         <a:rPr b="1" lang="fr-FR" sz="1800" spc="-1" strike="noStrike">
@@ -4121,12 +4126,8 @@
                         </a:rPr>
                         <a:t>Doubly linked list</a:t>
                       </a:r>
-                      <a:endParaRPr b="1" lang="fr-FR" sz="1800" spc="-1" strike="noStrike">
-                        <a:solidFill>
-                          <a:srgbClr val="ffffff"/>
-                        </a:solidFill>
+                      <a:endParaRPr b="0" lang="en-US" sz="1800" spc="-1" strike="noStrike">
                         <a:latin typeface="Arial"/>
-                        <a:ea typeface="Noto Sans CJK SC"/>
                       </a:endParaRPr>
                     </a:p>
                   </a:txBody>
@@ -4310,7 +4311,7 @@
                         <a:srgbClr val="ffffff"/>
                       </a:solidFill>
                     </a:lnL>
-                    <a:lnR>
+                    <a:lnR w="12240">
                       <a:noFill/>
                     </a:lnR>
                     <a:lnT w="12240">
@@ -4350,7 +4351,7 @@
                         <a:t>O(n)</a:t>
                       </a:r>
                       <a:endParaRPr b="0" lang="en-US" sz="1500" spc="-1" strike="noStrike">
-                        <a:latin typeface="Times New Roman"/>
+                        <a:latin typeface="Arial"/>
                       </a:endParaRPr>
                     </a:p>
                   </a:txBody>
@@ -4516,7 +4517,7 @@
                         <a:srgbClr val="ffffff"/>
                       </a:solidFill>
                     </a:lnL>
-                    <a:lnR>
+                    <a:lnR w="12240">
                       <a:noFill/>
                     </a:lnR>
                     <a:lnT w="12240">
@@ -4556,7 +4557,7 @@
                         <a:t>O(1)</a:t>
                       </a:r>
                       <a:endParaRPr b="0" lang="en-US" sz="1500" spc="-1" strike="noStrike">
-                        <a:latin typeface="Times New Roman"/>
+                        <a:latin typeface="Arial"/>
                       </a:endParaRPr>
                     </a:p>
                   </a:txBody>
@@ -4722,7 +4723,7 @@
                         <a:srgbClr val="ffffff"/>
                       </a:solidFill>
                     </a:lnL>
-                    <a:lnR>
+                    <a:lnR w="12240">
                       <a:noFill/>
                     </a:lnR>
                     <a:lnT w="12240">
@@ -4762,7 +4763,7 @@
                         <a:t>O(n)</a:t>
                       </a:r>
                       <a:endParaRPr b="0" lang="en-US" sz="1500" spc="-1" strike="noStrike">
-                        <a:latin typeface="Times New Roman"/>
+                        <a:latin typeface="Arial"/>
                       </a:endParaRPr>
                     </a:p>
                   </a:txBody>
@@ -4931,7 +4932,7 @@
                         <a:srgbClr val="ffffff"/>
                       </a:solidFill>
                     </a:lnL>
-                    <a:lnR>
+                    <a:lnR w="12240">
                       <a:noFill/>
                     </a:lnR>
                     <a:lnT w="12240">
@@ -4971,7 +4972,7 @@
                         <a:t>O(1)</a:t>
                       </a:r>
                       <a:endParaRPr b="0" lang="en-US" sz="1500" spc="-1" strike="noStrike">
-                        <a:latin typeface="Times New Roman"/>
+                        <a:latin typeface="Arial"/>
                       </a:endParaRPr>
                     </a:p>
                   </a:txBody>
@@ -5127,7 +5128,7 @@
                         <a:srgbClr val="ffffff"/>
                       </a:solidFill>
                     </a:lnL>
-                    <a:lnR>
+                    <a:lnR w="12240">
                       <a:noFill/>
                     </a:lnR>
                     <a:lnT w="12240">
@@ -5165,7 +5166,7 @@
                         <a:t>O(1)</a:t>
                       </a:r>
                       <a:endParaRPr b="0" lang="en-US" sz="1500" spc="-1" strike="noStrike">
-                        <a:latin typeface="Times New Roman"/>
+                        <a:latin typeface="Arial"/>
                       </a:endParaRPr>
                     </a:p>
                   </a:txBody>
@@ -5334,7 +5335,7 @@
                         <a:srgbClr val="ffffff"/>
                       </a:solidFill>
                     </a:lnL>
-                    <a:lnR>
+                    <a:lnR w="12240">
                       <a:noFill/>
                     </a:lnR>
                     <a:lnT w="12240">
@@ -5374,7 +5375,7 @@
                         <a:t>O(n)</a:t>
                       </a:r>
                       <a:endParaRPr b="0" lang="en-US" sz="1500" spc="-1" strike="noStrike">
-                        <a:latin typeface="Times New Roman"/>
+                        <a:latin typeface="Arial"/>
                       </a:endParaRPr>
                     </a:p>
                   </a:txBody>
@@ -5536,7 +5537,7 @@
                         <a:srgbClr val="ffffff"/>
                       </a:solidFill>
                     </a:lnL>
-                    <a:lnR>
+                    <a:lnR w="12240">
                       <a:noFill/>
                     </a:lnR>
                     <a:lnT>
@@ -5574,7 +5575,7 @@
                         <a:t>O(1)</a:t>
                       </a:r>
                       <a:endParaRPr b="0" lang="en-US" sz="1500" spc="-1" strike="noStrike">
-                        <a:latin typeface="Times New Roman"/>
+                        <a:latin typeface="Arial"/>
                       </a:endParaRPr>
                     </a:p>
                   </a:txBody>
@@ -5740,7 +5741,7 @@
                         <a:srgbClr val="ffffff"/>
                       </a:solidFill>
                     </a:lnL>
-                    <a:lnR>
+                    <a:lnR w="12240">
                       <a:noFill/>
                     </a:lnR>
                     <a:lnT w="12240">
@@ -5780,7 +5781,7 @@
                         <a:t>O(n)</a:t>
                       </a:r>
                       <a:endParaRPr b="0" lang="en-US" sz="1500" spc="-1" strike="noStrike">
-                        <a:latin typeface="Times New Roman"/>
+                        <a:latin typeface="Arial"/>
                       </a:endParaRPr>
                     </a:p>
                   </a:txBody>
@@ -5946,7 +5947,7 @@
                         <a:srgbClr val="ffffff"/>
                       </a:solidFill>
                     </a:lnL>
-                    <a:lnR>
+                    <a:lnR w="12240">
                       <a:noFill/>
                     </a:lnR>
                     <a:lnT w="12240">
@@ -5986,7 +5987,7 @@
                         <a:t>O(n)</a:t>
                       </a:r>
                       <a:endParaRPr b="0" lang="en-US" sz="1500" spc="-1" strike="noStrike">
-                        <a:latin typeface="Times New Roman"/>
+                        <a:latin typeface="Arial"/>
                       </a:endParaRPr>
                     </a:p>
                   </a:txBody>
@@ -6146,7 +6147,7 @@
                         <a:srgbClr val="ffffff"/>
                       </a:solidFill>
                     </a:lnL>
-                    <a:lnR>
+                    <a:lnR w="12240">
                       <a:noFill/>
                     </a:lnR>
                     <a:lnT w="12240">
@@ -6186,7 +6187,7 @@
                         <a:t>O(n)</a:t>
                       </a:r>
                       <a:endParaRPr b="0" lang="en-US" sz="1500" spc="-1" strike="noStrike">
-                        <a:latin typeface="Times New Roman"/>
+                        <a:latin typeface="Arial"/>
                       </a:endParaRPr>
                     </a:p>
                   </a:txBody>
@@ -6253,7 +6254,7 @@
         <p:spPr>
           <a:xfrm>
             <a:off x="314280" y="1184400"/>
-            <a:ext cx="8510400" cy="3360600"/>
+            <a:ext cx="8509680" cy="3359880"/>
           </a:xfrm>
           <a:prstGeom prst="rect">
             <a:avLst/>
@@ -6360,7 +6361,7 @@
         <p:spPr>
           <a:xfrm>
             <a:off x="314280" y="267480"/>
-            <a:ext cx="8510400" cy="738720"/>
+            <a:ext cx="8509680" cy="738000"/>
           </a:xfrm>
           <a:prstGeom prst="rect">
             <a:avLst/>
@@ -6890,14 +6891,121 @@
       </p:grpSpPr>
       <p:sp>
         <p:nvSpPr>
-          <p:cNvPr id="86" name="TextShape 3"/>
+          <p:cNvPr id="86" name="TextShape 6"/>
           <p:cNvSpPr/>
           <p:nvPr/>
         </p:nvSpPr>
         <p:spPr>
           <a:xfrm>
-            <a:off x="1152000" y="1634400"/>
-            <a:ext cx="8510400" cy="738720"/>
+            <a:off x="314280" y="1184400"/>
+            <a:ext cx="8509680" cy="3359880"/>
+          </a:xfrm>
+          <a:prstGeom prst="rect">
+            <a:avLst/>
+          </a:prstGeom>
+          <a:noFill/>
+          <a:ln w="0">
+            <a:noFill/>
+          </a:ln>
+        </p:spPr>
+        <p:style>
+          <a:lnRef idx="0"/>
+          <a:fillRef idx="0"/>
+          <a:effectRef idx="0"/>
+          <a:fontRef idx="minor"/>
+        </p:style>
+        <p:txBody>
+          <a:bodyPr lIns="0" rIns="0" tIns="0" bIns="0" anchor="t">
+            <a:noAutofit/>
+          </a:bodyPr>
+          <a:p>
+            <a:pPr>
+              <a:lnSpc>
+                <a:spcPct val="100000"/>
+              </a:lnSpc>
+              <a:spcBef>
+                <a:spcPts val="281"/>
+              </a:spcBef>
+              <a:buNone/>
+            </a:pPr>
+            <a:endParaRPr b="0" lang="en-US" sz="2000" spc="-1" strike="noStrike">
+              <a:latin typeface="Arial"/>
+            </a:endParaRPr>
+          </a:p>
+          <a:p>
+            <a:pPr>
+              <a:lnSpc>
+                <a:spcPct val="100000"/>
+              </a:lnSpc>
+              <a:spcBef>
+                <a:spcPts val="281"/>
+              </a:spcBef>
+              <a:buNone/>
+            </a:pPr>
+            <a:endParaRPr b="0" lang="en-US" sz="2000" spc="-1" strike="noStrike">
+              <a:latin typeface="Arial"/>
+            </a:endParaRPr>
+          </a:p>
+          <a:p>
+            <a:pPr>
+              <a:lnSpc>
+                <a:spcPct val="90000"/>
+              </a:lnSpc>
+              <a:spcBef>
+                <a:spcPts val="601"/>
+              </a:spcBef>
+              <a:buNone/>
+            </a:pPr>
+            <a:endParaRPr b="0" lang="en-US" sz="2000" spc="-1" strike="noStrike">
+              <a:latin typeface="Arial"/>
+            </a:endParaRPr>
+          </a:p>
+          <a:p>
+            <a:pPr>
+              <a:lnSpc>
+                <a:spcPct val="90000"/>
+              </a:lnSpc>
+              <a:spcBef>
+                <a:spcPts val="601"/>
+              </a:spcBef>
+              <a:buNone/>
+            </a:pPr>
+            <a:r>
+              <a:rPr b="0" lang="fr-FR" sz="1400" spc="-18" strike="noStrike" baseline="30000">
+                <a:solidFill>
+                  <a:srgbClr val="000000"/>
+                </a:solidFill>
+                <a:latin typeface="Helvetica 75 Bold"/>
+                <a:ea typeface="DejaVu Sans"/>
+              </a:rPr>
+              <a:t>	</a:t>
+            </a:r>
+            <a:r>
+              <a:rPr b="0" lang="fr-FR" sz="1400" spc="-18" strike="noStrike" baseline="30000">
+                <a:solidFill>
+                  <a:srgbClr val="000000"/>
+                </a:solidFill>
+                <a:latin typeface="Helvetica 75 Bold"/>
+                <a:ea typeface="DejaVu Sans"/>
+              </a:rPr>
+              <a:t>	</a:t>
+            </a:r>
+            <a:endParaRPr b="0" lang="en-US" sz="1400" spc="-1" strike="noStrike">
+              <a:latin typeface="Arial"/>
+            </a:endParaRPr>
+          </a:p>
+        </p:txBody>
+      </p:sp>
+      <p:sp>
+        <p:nvSpPr>
+          <p:cNvPr id="87" name="TextShape 7"/>
+          <p:cNvSpPr/>
+          <p:nvPr/>
+        </p:nvSpPr>
+        <p:spPr>
+          <a:xfrm>
+            <a:off x="314280" y="267480"/>
+            <a:ext cx="8509680" cy="738000"/>
           </a:xfrm>
           <a:prstGeom prst="rect">
             <a:avLst/>
@@ -6932,7 +7040,7 @@
                 <a:latin typeface="Helvetica 75 Bold"/>
                 <a:ea typeface="DejaVu Sans"/>
               </a:rPr>
-              <a:t>Annexe (pas à retenir)</a:t>
+              <a:t>Arbres binaires</a:t>
             </a:r>
             <a:endParaRPr b="0" lang="en-US" sz="2000" spc="-1" strike="noStrike">
               <a:latin typeface="Arial"/>
@@ -6940,6 +7048,101 @@
           </a:p>
         </p:txBody>
       </p:sp>
+      <p:sp>
+        <p:nvSpPr>
+          <p:cNvPr id="88" name=""/>
+          <p:cNvSpPr/>
+          <p:nvPr/>
+        </p:nvSpPr>
+        <p:spPr>
+          <a:xfrm>
+            <a:off x="457200" y="888120"/>
+            <a:ext cx="7611480" cy="940320"/>
+          </a:xfrm>
+          <a:prstGeom prst="rect">
+            <a:avLst/>
+          </a:prstGeom>
+          <a:noFill/>
+          <a:ln w="0">
+            <a:noFill/>
+          </a:ln>
+        </p:spPr>
+        <p:style>
+          <a:lnRef idx="0"/>
+          <a:fillRef idx="0"/>
+          <a:effectRef idx="0"/>
+          <a:fontRef idx="minor"/>
+        </p:style>
+        <p:txBody>
+          <a:bodyPr lIns="90000" rIns="90000" tIns="45000" bIns="45000" anchor="t">
+            <a:noAutofit/>
+          </a:bodyPr>
+          <a:p>
+            <a:pPr>
+              <a:lnSpc>
+                <a:spcPct val="100000"/>
+              </a:lnSpc>
+              <a:buNone/>
+            </a:pPr>
+            <a:r>
+              <a:rPr b="0" lang="en-US" sz="2000" spc="-1" strike="noStrike">
+                <a:solidFill>
+                  <a:srgbClr val="000000"/>
+                </a:solidFill>
+                <a:latin typeface="Arial"/>
+                <a:ea typeface="DejaVu Sans"/>
+              </a:rPr>
+              <a:t>Si l’arbre a n noeuds, la hauteur de l’arbre est log</a:t>
+            </a:r>
+            <a:r>
+              <a:rPr b="0" lang="en-US" sz="2000" spc="-1" strike="noStrike" baseline="-8000">
+                <a:solidFill>
+                  <a:srgbClr val="000000"/>
+                </a:solidFill>
+                <a:latin typeface="Arial"/>
+                <a:ea typeface="DejaVu Sans"/>
+              </a:rPr>
+              <a:t>2</a:t>
+            </a:r>
+            <a:r>
+              <a:rPr b="0" lang="en-US" sz="2000" spc="-1" strike="noStrike">
+                <a:solidFill>
+                  <a:srgbClr val="000000"/>
+                </a:solidFill>
+                <a:latin typeface="Arial"/>
+                <a:ea typeface="DejaVu Sans"/>
+              </a:rPr>
+              <a:t>(n) dans le meilleurs cas (arbre équilibré) et n dans le pire cas.</a:t>
+            </a:r>
+            <a:endParaRPr b="0" lang="en-US" sz="2000" spc="-1" strike="noStrike">
+              <a:latin typeface="Arial"/>
+            </a:endParaRPr>
+          </a:p>
+        </p:txBody>
+      </p:sp>
+      <p:pic>
+        <p:nvPicPr>
+          <p:cNvPr id="89" name="" descr=""/>
+          <p:cNvPicPr/>
+          <p:nvPr/>
+        </p:nvPicPr>
+        <p:blipFill>
+          <a:blip r:embed="rId1"/>
+          <a:stretch/>
+        </p:blipFill>
+        <p:spPr>
+          <a:xfrm>
+            <a:off x="714600" y="2286000"/>
+            <a:ext cx="7057440" cy="2485440"/>
+          </a:xfrm>
+          <a:prstGeom prst="rect">
+            <a:avLst/>
+          </a:prstGeom>
+          <a:ln w="0">
+            <a:noFill/>
+          </a:ln>
+        </p:spPr>
+      </p:pic>
     </p:spTree>
   </p:cSld>
   <p:transition spd="med">
@@ -6967,14 +7170,14 @@
       </p:grpSpPr>
       <p:sp>
         <p:nvSpPr>
-          <p:cNvPr id="87" name="TextShape 1"/>
+          <p:cNvPr id="90" name="TextShape 3"/>
           <p:cNvSpPr/>
           <p:nvPr/>
         </p:nvSpPr>
         <p:spPr>
           <a:xfrm>
-            <a:off x="314280" y="267480"/>
-            <a:ext cx="8510400" cy="738720"/>
+            <a:off x="1152000" y="1634400"/>
+            <a:ext cx="8509680" cy="738000"/>
           </a:xfrm>
           <a:prstGeom prst="rect">
             <a:avLst/>
@@ -7009,7 +7212,7 @@
                 <a:latin typeface="Helvetica 75 Bold"/>
                 <a:ea typeface="DejaVu Sans"/>
               </a:rPr>
-              <a:t>Complexité</a:t>
+              <a:t>Annexe (pas à retenir)</a:t>
             </a:r>
             <a:endParaRPr b="0" lang="en-US" sz="2000" spc="-1" strike="noStrike">
               <a:latin typeface="Arial"/>
@@ -7017,29 +7220,6 @@
           </a:p>
         </p:txBody>
       </p:sp>
-      <p:pic>
-        <p:nvPicPr>
-          <p:cNvPr id="88" name="Picture 3" descr=""/>
-          <p:cNvPicPr/>
-          <p:nvPr/>
-        </p:nvPicPr>
-        <p:blipFill>
-          <a:blip r:embed="rId1"/>
-          <a:stretch/>
-        </p:blipFill>
-        <p:spPr>
-          <a:xfrm>
-            <a:off x="395640" y="843480"/>
-            <a:ext cx="8032320" cy="3326040"/>
-          </a:xfrm>
-          <a:prstGeom prst="rect">
-            <a:avLst/>
-          </a:prstGeom>
-          <a:ln w="0">
-            <a:noFill/>
-          </a:ln>
-        </p:spPr>
-      </p:pic>
     </p:spTree>
   </p:cSld>
   <p:transition spd="med">
@@ -7067,14 +7247,114 @@
       </p:grpSpPr>
       <p:sp>
         <p:nvSpPr>
-          <p:cNvPr id="89" name="TextShape 1"/>
+          <p:cNvPr id="91" name="TextShape 1"/>
           <p:cNvSpPr/>
           <p:nvPr/>
         </p:nvSpPr>
         <p:spPr>
           <a:xfrm>
             <a:off x="314280" y="267480"/>
-            <a:ext cx="8510400" cy="738720"/>
+            <a:ext cx="8509680" cy="738000"/>
+          </a:xfrm>
+          <a:prstGeom prst="rect">
+            <a:avLst/>
+          </a:prstGeom>
+          <a:noFill/>
+          <a:ln w="0">
+            <a:noFill/>
+          </a:ln>
+        </p:spPr>
+        <p:style>
+          <a:lnRef idx="0"/>
+          <a:fillRef idx="0"/>
+          <a:effectRef idx="0"/>
+          <a:fontRef idx="minor"/>
+        </p:style>
+        <p:txBody>
+          <a:bodyPr lIns="0" rIns="0" tIns="0" bIns="0" anchor="t">
+            <a:noAutofit/>
+          </a:bodyPr>
+          <a:p>
+            <a:pPr>
+              <a:lnSpc>
+                <a:spcPct val="90000"/>
+              </a:lnSpc>
+              <a:buNone/>
+            </a:pPr>
+            <a:r>
+              <a:rPr b="0" lang="fr-FR" sz="2000" spc="-18" strike="noStrike">
+                <a:solidFill>
+                  <a:srgbClr val="ff7900"/>
+                </a:solidFill>
+                <a:latin typeface="Helvetica 75 Bold"/>
+                <a:ea typeface="DejaVu Sans"/>
+              </a:rPr>
+              <a:t>Complexité</a:t>
+            </a:r>
+            <a:endParaRPr b="0" lang="en-US" sz="2000" spc="-1" strike="noStrike">
+              <a:latin typeface="Arial"/>
+            </a:endParaRPr>
+          </a:p>
+        </p:txBody>
+      </p:sp>
+      <p:pic>
+        <p:nvPicPr>
+          <p:cNvPr id="92" name="Picture 3" descr=""/>
+          <p:cNvPicPr/>
+          <p:nvPr/>
+        </p:nvPicPr>
+        <p:blipFill>
+          <a:blip r:embed="rId1"/>
+          <a:stretch/>
+        </p:blipFill>
+        <p:spPr>
+          <a:xfrm>
+            <a:off x="395640" y="843480"/>
+            <a:ext cx="8031600" cy="3325320"/>
+          </a:xfrm>
+          <a:prstGeom prst="rect">
+            <a:avLst/>
+          </a:prstGeom>
+          <a:ln w="0">
+            <a:noFill/>
+          </a:ln>
+        </p:spPr>
+      </p:pic>
+    </p:spTree>
+  </p:cSld>
+  <p:transition spd="med">
+    <p:fade/>
+  </p:transition>
+</p:sld>
+</file>
+
+<file path=ppt/slides/slide6.xml><?xml version="1.0" encoding="utf-8"?>
+<p:sld xmlns:a="http://schemas.openxmlformats.org/drawingml/2006/main" xmlns:p="http://schemas.openxmlformats.org/presentationml/2006/main" xmlns:r="http://schemas.openxmlformats.org/officeDocument/2006/relationships" xmlns:p14="http://schemas.microsoft.com/office/powerpoint/2010/main" xmlns:p15="http://schemas.microsoft.com/office/powerpoint/2012/main" xmlns:mc="http://schemas.openxmlformats.org/markup-compatibility/2006">
+  <p:cSld>
+    <p:spTree>
+      <p:nvGrpSpPr>
+        <p:cNvPr id="1" name=""/>
+        <p:cNvGrpSpPr/>
+        <p:nvPr/>
+      </p:nvGrpSpPr>
+      <p:grpSpPr>
+        <a:xfrm>
+          <a:off x="0" y="0"/>
+          <a:ext cx="0" cy="0"/>
+          <a:chOff x="0" y="0"/>
+          <a:chExt cx="0" cy="0"/>
+        </a:xfrm>
+      </p:grpSpPr>
+      <p:sp>
+        <p:nvSpPr>
+          <p:cNvPr id="93" name="TextShape 1"/>
+          <p:cNvSpPr/>
+          <p:nvPr/>
+        </p:nvSpPr>
+        <p:spPr>
+          <a:xfrm>
+            <a:off x="314280" y="267480"/>
+            <a:ext cx="8509680" cy="738000"/>
           </a:xfrm>
           <a:prstGeom prst="rect">
             <a:avLst/>
@@ -7119,7 +7399,7 @@
       </p:sp>
       <p:pic>
         <p:nvPicPr>
-          <p:cNvPr id="90" name="Picture 2" descr=""/>
+          <p:cNvPr id="94" name="Picture 2" descr=""/>
           <p:cNvPicPr/>
           <p:nvPr/>
         </p:nvPicPr>
@@ -7130,7 +7410,7 @@
         <p:spPr>
           <a:xfrm>
             <a:off x="683640" y="1203480"/>
-            <a:ext cx="6228000" cy="3501000"/>
+            <a:ext cx="6227280" cy="3500280"/>
           </a:xfrm>
           <a:prstGeom prst="rect">
             <a:avLst/>

</xml_diff>